<commit_message>
Added some comments in powerpoint
</commit_message>
<xml_diff>
--- a/presentation/Presentation - Ferlin Orsenigo Saccani.pptx
+++ b/presentation/Presentation - Ferlin Orsenigo Saccani.pptx
@@ -5208,11 +5208,7 @@
           <a:bodyPr/>
           <a:lstStyle/>
           <a:p>
-            <a:endParaRPr lang="it-IT" b="0">
-              <a:solidFill>
-                <a:srgbClr val="FF0000"/>
-              </a:solidFill>
-            </a:endParaRPr>
+            <a:endParaRPr lang="it-IT" dirty="0"/>
           </a:p>
         </p:txBody>
       </p:sp>
@@ -5233,7 +5229,7 @@
           <a:p>
             <a:fld id="{1EEEB9C4-2C44-416F-8AE9-56A3B0181F3B}" type="slidenum">
               <a:rPr lang="it-IT" smtClean="0"/>
-              <a:t>2</a:t>
+              <a:t>1</a:t>
             </a:fld>
             <a:endParaRPr lang="it-IT"/>
           </a:p>
@@ -5242,7 +5238,273 @@
     </p:spTree>
     <p:extLst>
       <p:ext uri="{BB962C8B-B14F-4D97-AF65-F5344CB8AC3E}">
-        <p14:creationId xmlns:p14="http://schemas.microsoft.com/office/powerpoint/2010/main" val="1528310201"/>
+        <p14:creationId xmlns:p14="http://schemas.microsoft.com/office/powerpoint/2010/main" val="4060172671"/>
+      </p:ext>
+    </p:extLst>
+  </p:cSld>
+  <p:clrMapOvr>
+    <a:masterClrMapping/>
+  </p:clrMapOvr>
+</p:notes>
+</file>
+
+<file path=ppt/notesSlides/notesSlide10.xml><?xml version="1.0" encoding="utf-8"?>
+<p:notes xmlns:a="http://schemas.openxmlformats.org/drawingml/2006/main" xmlns:r="http://schemas.openxmlformats.org/officeDocument/2006/relationships" xmlns:p="http://schemas.openxmlformats.org/presentationml/2006/main">
+  <p:cSld>
+    <p:spTree>
+      <p:nvGrpSpPr>
+        <p:cNvPr id="1" name=""/>
+        <p:cNvGrpSpPr/>
+        <p:nvPr/>
+      </p:nvGrpSpPr>
+      <p:grpSpPr>
+        <a:xfrm>
+          <a:off x="0" y="0"/>
+          <a:ext cx="0" cy="0"/>
+          <a:chOff x="0" y="0"/>
+          <a:chExt cx="0" cy="0"/>
+        </a:xfrm>
+      </p:grpSpPr>
+      <p:sp>
+        <p:nvSpPr>
+          <p:cNvPr id="2" name="Segnaposto immagine diapositiva 1"/>
+          <p:cNvSpPr>
+            <a:spLocks noGrp="1" noRot="1" noChangeAspect="1"/>
+          </p:cNvSpPr>
+          <p:nvPr>
+            <p:ph type="sldImg"/>
+          </p:nvPr>
+        </p:nvSpPr>
+        <p:spPr/>
+      </p:sp>
+      <p:sp>
+        <p:nvSpPr>
+          <p:cNvPr id="3" name="Segnaposto note 2"/>
+          <p:cNvSpPr>
+            <a:spLocks noGrp="1"/>
+          </p:cNvSpPr>
+          <p:nvPr>
+            <p:ph type="body" idx="1"/>
+          </p:nvPr>
+        </p:nvSpPr>
+        <p:spPr/>
+        <p:txBody>
+          <a:bodyPr/>
+          <a:lstStyle/>
+          <a:p>
+            <a:r>
+              <a:rPr lang="it-IT" b="1" dirty="0"/>
+              <a:t>After </a:t>
+            </a:r>
+            <a:r>
+              <a:rPr lang="it-IT" b="1" dirty="0" err="1"/>
+              <a:t>this</a:t>
+            </a:r>
+            <a:r>
+              <a:rPr lang="it-IT" b="1" dirty="0"/>
+              <a:t> slide RASD part </a:t>
+            </a:r>
+            <a:r>
+              <a:rPr lang="it-IT" b="1" dirty="0" err="1"/>
+              <a:t>completed</a:t>
+            </a:r>
+            <a:r>
+              <a:rPr lang="it-IT" b="1" dirty="0"/>
+              <a:t>  -&gt; </a:t>
+            </a:r>
+            <a:r>
+              <a:rPr lang="it-IT" b="1" dirty="0" err="1"/>
+              <a:t>We</a:t>
+            </a:r>
+            <a:r>
+              <a:rPr lang="it-IT" b="1" dirty="0"/>
+              <a:t> </a:t>
+            </a:r>
+            <a:r>
+              <a:rPr lang="it-IT" b="1" dirty="0" err="1"/>
+              <a:t>will</a:t>
+            </a:r>
+            <a:r>
+              <a:rPr lang="it-IT" b="1" dirty="0"/>
+              <a:t> start </a:t>
+            </a:r>
+            <a:r>
+              <a:rPr lang="it-IT" b="1" dirty="0" err="1"/>
+              <a:t>talking</a:t>
+            </a:r>
+            <a:r>
+              <a:rPr lang="it-IT" b="1" dirty="0"/>
+              <a:t> </a:t>
+            </a:r>
+            <a:r>
+              <a:rPr lang="it-IT" b="1" dirty="0" err="1"/>
+              <a:t>about</a:t>
+            </a:r>
+            <a:r>
+              <a:rPr lang="it-IT" b="1" dirty="0"/>
+              <a:t> DD</a:t>
+            </a:r>
+            <a:br>
+              <a:rPr lang="it-IT" b="1" dirty="0"/>
+            </a:br>
+            <a:r>
+              <a:rPr lang="it-IT" b="1" dirty="0" err="1"/>
+              <a:t>Change</a:t>
+            </a:r>
+            <a:r>
+              <a:rPr lang="it-IT" b="1" dirty="0"/>
+              <a:t> </a:t>
+            </a:r>
+            <a:r>
+              <a:rPr lang="it-IT" b="1" dirty="0" err="1"/>
+              <a:t>person</a:t>
+            </a:r>
+            <a:r>
+              <a:rPr lang="it-IT" b="1" dirty="0"/>
+              <a:t> </a:t>
+            </a:r>
+            <a:r>
+              <a:rPr lang="it-IT" b="1" dirty="0" err="1"/>
+              <a:t>speaking</a:t>
+            </a:r>
+            <a:r>
+              <a:rPr lang="it-IT" b="1" dirty="0"/>
+              <a:t> (Orsenigo </a:t>
+            </a:r>
+            <a:r>
+              <a:rPr lang="it-IT" b="1" dirty="0" err="1"/>
+              <a:t>Now</a:t>
+            </a:r>
+            <a:r>
+              <a:rPr lang="it-IT" b="1" dirty="0"/>
+              <a:t> </a:t>
+            </a:r>
+            <a:r>
+              <a:rPr lang="it-IT" b="1" dirty="0" err="1"/>
+              <a:t>Speaking</a:t>
+            </a:r>
+            <a:r>
+              <a:rPr lang="it-IT" b="1" dirty="0"/>
+              <a:t>) </a:t>
+            </a:r>
+          </a:p>
+        </p:txBody>
+      </p:sp>
+      <p:sp>
+        <p:nvSpPr>
+          <p:cNvPr id="4" name="Segnaposto numero diapositiva 3"/>
+          <p:cNvSpPr>
+            <a:spLocks noGrp="1"/>
+          </p:cNvSpPr>
+          <p:nvPr>
+            <p:ph type="sldNum" sz="quarter" idx="5"/>
+          </p:nvPr>
+        </p:nvSpPr>
+        <p:spPr/>
+        <p:txBody>
+          <a:bodyPr/>
+          <a:lstStyle/>
+          <a:p>
+            <a:fld id="{1EEEB9C4-2C44-416F-8AE9-56A3B0181F3B}" type="slidenum">
+              <a:rPr lang="it-IT" smtClean="0"/>
+              <a:t>12</a:t>
+            </a:fld>
+            <a:endParaRPr lang="it-IT"/>
+          </a:p>
+        </p:txBody>
+      </p:sp>
+    </p:spTree>
+    <p:extLst>
+      <p:ext uri="{BB962C8B-B14F-4D97-AF65-F5344CB8AC3E}">
+        <p14:creationId xmlns:p14="http://schemas.microsoft.com/office/powerpoint/2010/main" val="2581798687"/>
+      </p:ext>
+    </p:extLst>
+  </p:cSld>
+  <p:clrMapOvr>
+    <a:masterClrMapping/>
+  </p:clrMapOvr>
+</p:notes>
+</file>
+
+<file path=ppt/notesSlides/notesSlide11.xml><?xml version="1.0" encoding="utf-8"?>
+<p:notes xmlns:a="http://schemas.openxmlformats.org/drawingml/2006/main" xmlns:r="http://schemas.openxmlformats.org/officeDocument/2006/relationships" xmlns:p="http://schemas.openxmlformats.org/presentationml/2006/main">
+  <p:cSld>
+    <p:spTree>
+      <p:nvGrpSpPr>
+        <p:cNvPr id="1" name=""/>
+        <p:cNvGrpSpPr/>
+        <p:nvPr/>
+      </p:nvGrpSpPr>
+      <p:grpSpPr>
+        <a:xfrm>
+          <a:off x="0" y="0"/>
+          <a:ext cx="0" cy="0"/>
+          <a:chOff x="0" y="0"/>
+          <a:chExt cx="0" cy="0"/>
+        </a:xfrm>
+      </p:grpSpPr>
+      <p:sp>
+        <p:nvSpPr>
+          <p:cNvPr id="2" name="Segnaposto immagine diapositiva 1"/>
+          <p:cNvSpPr>
+            <a:spLocks noGrp="1" noRot="1" noChangeAspect="1"/>
+          </p:cNvSpPr>
+          <p:nvPr>
+            <p:ph type="sldImg"/>
+          </p:nvPr>
+        </p:nvSpPr>
+        <p:spPr/>
+      </p:sp>
+      <p:sp>
+        <p:nvSpPr>
+          <p:cNvPr id="3" name="Segnaposto note 2"/>
+          <p:cNvSpPr>
+            <a:spLocks noGrp="1"/>
+          </p:cNvSpPr>
+          <p:nvPr>
+            <p:ph type="body" idx="1"/>
+          </p:nvPr>
+        </p:nvSpPr>
+        <p:spPr/>
+        <p:txBody>
+          <a:bodyPr/>
+          <a:lstStyle/>
+          <a:p>
+            <a:endParaRPr lang="it-IT" b="0">
+              <a:solidFill>
+                <a:srgbClr val="FF0000"/>
+              </a:solidFill>
+            </a:endParaRPr>
+          </a:p>
+        </p:txBody>
+      </p:sp>
+      <p:sp>
+        <p:nvSpPr>
+          <p:cNvPr id="4" name="Segnaposto numero diapositiva 3"/>
+          <p:cNvSpPr>
+            <a:spLocks noGrp="1"/>
+          </p:cNvSpPr>
+          <p:nvPr>
+            <p:ph type="sldNum" sz="quarter" idx="5"/>
+          </p:nvPr>
+        </p:nvSpPr>
+        <p:spPr/>
+        <p:txBody>
+          <a:bodyPr/>
+          <a:lstStyle/>
+          <a:p>
+            <a:fld id="{1EEEB9C4-2C44-416F-8AE9-56A3B0181F3B}" type="slidenum">
+              <a:rPr lang="it-IT" smtClean="0"/>
+              <a:t>13</a:t>
+            </a:fld>
+            <a:endParaRPr lang="it-IT"/>
+          </a:p>
+        </p:txBody>
+      </p:sp>
+    </p:spTree>
+    <p:extLst>
+      <p:ext uri="{BB962C8B-B14F-4D97-AF65-F5344CB8AC3E}">
+        <p14:creationId xmlns:p14="http://schemas.microsoft.com/office/powerpoint/2010/main" val="326147060"/>
       </p:ext>
     </p:extLst>
   </p:cSld>
@@ -5296,11 +5558,46 @@
           <a:bodyPr/>
           <a:lstStyle/>
           <a:p>
-            <a:endParaRPr lang="it-IT" b="0">
-              <a:solidFill>
-                <a:srgbClr val="FF0000"/>
-              </a:solidFill>
-            </a:endParaRPr>
+            <a:r>
+              <a:rPr lang="it-IT" b="1" dirty="0">
+                <a:solidFill>
+                  <a:srgbClr val="FF0000"/>
+                </a:solidFill>
+              </a:rPr>
+              <a:t>Start </a:t>
+            </a:r>
+            <a:r>
+              <a:rPr lang="it-IT" b="1" dirty="0" err="1">
+                <a:solidFill>
+                  <a:srgbClr val="FF0000"/>
+                </a:solidFill>
+              </a:rPr>
+              <a:t>person</a:t>
+            </a:r>
+            <a:r>
+              <a:rPr lang="it-IT" b="1" dirty="0">
+                <a:solidFill>
+                  <a:srgbClr val="FF0000"/>
+                </a:solidFill>
+              </a:rPr>
+              <a:t> </a:t>
+            </a:r>
+            <a:r>
+              <a:rPr lang="it-IT" b="1" dirty="0" err="1">
+                <a:solidFill>
+                  <a:srgbClr val="FF0000"/>
+                </a:solidFill>
+              </a:rPr>
+              <a:t>talking</a:t>
+            </a:r>
+            <a:r>
+              <a:rPr lang="it-IT" b="1" dirty="0">
+                <a:solidFill>
+                  <a:srgbClr val="FF0000"/>
+                </a:solidFill>
+              </a:rPr>
+              <a:t> (Orsenigo)</a:t>
+            </a:r>
           </a:p>
         </p:txBody>
       </p:sp>
@@ -5321,7 +5618,7 @@
           <a:p>
             <a:fld id="{1EEEB9C4-2C44-416F-8AE9-56A3B0181F3B}" type="slidenum">
               <a:rPr lang="it-IT" smtClean="0"/>
-              <a:t>13</a:t>
+              <a:t>2</a:t>
             </a:fld>
             <a:endParaRPr lang="it-IT"/>
           </a:p>
@@ -5330,7 +5627,1048 @@
     </p:spTree>
     <p:extLst>
       <p:ext uri="{BB962C8B-B14F-4D97-AF65-F5344CB8AC3E}">
-        <p14:creationId xmlns:p14="http://schemas.microsoft.com/office/powerpoint/2010/main" val="326147060"/>
+        <p14:creationId xmlns:p14="http://schemas.microsoft.com/office/powerpoint/2010/main" val="1528310201"/>
+      </p:ext>
+    </p:extLst>
+  </p:cSld>
+  <p:clrMapOvr>
+    <a:masterClrMapping/>
+  </p:clrMapOvr>
+</p:notes>
+</file>
+
+<file path=ppt/notesSlides/notesSlide3.xml><?xml version="1.0" encoding="utf-8"?>
+<p:notes xmlns:a="http://schemas.openxmlformats.org/drawingml/2006/main" xmlns:r="http://schemas.openxmlformats.org/officeDocument/2006/relationships" xmlns:p="http://schemas.openxmlformats.org/presentationml/2006/main">
+  <p:cSld>
+    <p:spTree>
+      <p:nvGrpSpPr>
+        <p:cNvPr id="1" name=""/>
+        <p:cNvGrpSpPr/>
+        <p:nvPr/>
+      </p:nvGrpSpPr>
+      <p:grpSpPr>
+        <a:xfrm>
+          <a:off x="0" y="0"/>
+          <a:ext cx="0" cy="0"/>
+          <a:chOff x="0" y="0"/>
+          <a:chExt cx="0" cy="0"/>
+        </a:xfrm>
+      </p:grpSpPr>
+      <p:sp>
+        <p:nvSpPr>
+          <p:cNvPr id="2" name="Segnaposto immagine diapositiva 1"/>
+          <p:cNvSpPr>
+            <a:spLocks noGrp="1" noRot="1" noChangeAspect="1"/>
+          </p:cNvSpPr>
+          <p:nvPr>
+            <p:ph type="sldImg"/>
+          </p:nvPr>
+        </p:nvSpPr>
+        <p:spPr/>
+      </p:sp>
+      <p:sp>
+        <p:nvSpPr>
+          <p:cNvPr id="3" name="Segnaposto note 2"/>
+          <p:cNvSpPr>
+            <a:spLocks noGrp="1"/>
+          </p:cNvSpPr>
+          <p:nvPr>
+            <p:ph type="body" idx="1"/>
+          </p:nvPr>
+        </p:nvSpPr>
+        <p:spPr/>
+        <p:txBody>
+          <a:bodyPr/>
+          <a:lstStyle/>
+          <a:p>
+            <a:r>
+              <a:rPr lang="it-IT" dirty="0"/>
+              <a:t>Skip </a:t>
+            </a:r>
+            <a:r>
+              <a:rPr lang="it-IT" b="1" dirty="0" err="1"/>
+              <a:t>immediatly</a:t>
+            </a:r>
+            <a:r>
+              <a:rPr lang="it-IT" dirty="0"/>
+              <a:t> to the </a:t>
+            </a:r>
+            <a:r>
+              <a:rPr lang="it-IT" dirty="0" err="1"/>
+              <a:t>next</a:t>
+            </a:r>
+            <a:r>
+              <a:rPr lang="it-IT" dirty="0"/>
+              <a:t> slide to </a:t>
+            </a:r>
+            <a:r>
+              <a:rPr lang="it-IT" dirty="0" err="1"/>
+              <a:t>see</a:t>
+            </a:r>
+            <a:r>
+              <a:rPr lang="it-IT" dirty="0"/>
+              <a:t> the </a:t>
+            </a:r>
+            <a:r>
+              <a:rPr lang="it-IT" dirty="0" err="1"/>
+              <a:t>subdivision</a:t>
+            </a:r>
+            <a:endParaRPr lang="it-IT" dirty="0"/>
+          </a:p>
+        </p:txBody>
+      </p:sp>
+      <p:sp>
+        <p:nvSpPr>
+          <p:cNvPr id="4" name="Segnaposto numero diapositiva 3"/>
+          <p:cNvSpPr>
+            <a:spLocks noGrp="1"/>
+          </p:cNvSpPr>
+          <p:nvPr>
+            <p:ph type="sldNum" sz="quarter" idx="5"/>
+          </p:nvPr>
+        </p:nvSpPr>
+        <p:spPr/>
+        <p:txBody>
+          <a:bodyPr/>
+          <a:lstStyle/>
+          <a:p>
+            <a:fld id="{1EEEB9C4-2C44-416F-8AE9-56A3B0181F3B}" type="slidenum">
+              <a:rPr lang="it-IT" smtClean="0"/>
+              <a:t>3</a:t>
+            </a:fld>
+            <a:endParaRPr lang="it-IT"/>
+          </a:p>
+        </p:txBody>
+      </p:sp>
+    </p:spTree>
+    <p:extLst>
+      <p:ext uri="{BB962C8B-B14F-4D97-AF65-F5344CB8AC3E}">
+        <p14:creationId xmlns:p14="http://schemas.microsoft.com/office/powerpoint/2010/main" val="2172660171"/>
+      </p:ext>
+    </p:extLst>
+  </p:cSld>
+  <p:clrMapOvr>
+    <a:masterClrMapping/>
+  </p:clrMapOvr>
+</p:notes>
+</file>
+
+<file path=ppt/notesSlides/notesSlide4.xml><?xml version="1.0" encoding="utf-8"?>
+<p:notes xmlns:a="http://schemas.openxmlformats.org/drawingml/2006/main" xmlns:r="http://schemas.openxmlformats.org/officeDocument/2006/relationships" xmlns:p="http://schemas.openxmlformats.org/presentationml/2006/main">
+  <p:cSld>
+    <p:spTree>
+      <p:nvGrpSpPr>
+        <p:cNvPr id="1" name=""/>
+        <p:cNvGrpSpPr/>
+        <p:nvPr/>
+      </p:nvGrpSpPr>
+      <p:grpSpPr>
+        <a:xfrm>
+          <a:off x="0" y="0"/>
+          <a:ext cx="0" cy="0"/>
+          <a:chOff x="0" y="0"/>
+          <a:chExt cx="0" cy="0"/>
+        </a:xfrm>
+      </p:grpSpPr>
+      <p:sp>
+        <p:nvSpPr>
+          <p:cNvPr id="2" name="Segnaposto immagine diapositiva 1"/>
+          <p:cNvSpPr>
+            <a:spLocks noGrp="1" noRot="1" noChangeAspect="1"/>
+          </p:cNvSpPr>
+          <p:nvPr>
+            <p:ph type="sldImg"/>
+          </p:nvPr>
+        </p:nvSpPr>
+        <p:spPr/>
+      </p:sp>
+      <p:sp>
+        <p:nvSpPr>
+          <p:cNvPr id="3" name="Segnaposto note 2"/>
+          <p:cNvSpPr>
+            <a:spLocks noGrp="1"/>
+          </p:cNvSpPr>
+          <p:nvPr>
+            <p:ph type="body" idx="1"/>
+          </p:nvPr>
+        </p:nvSpPr>
+        <p:spPr/>
+        <p:txBody>
+          <a:bodyPr/>
+          <a:lstStyle/>
+          <a:p>
+            <a:r>
+              <a:rPr lang="it-IT" dirty="0" err="1"/>
+              <a:t>Say</a:t>
+            </a:r>
+            <a:r>
+              <a:rPr lang="it-IT" dirty="0"/>
+              <a:t> the </a:t>
+            </a:r>
+            <a:r>
+              <a:rPr lang="it-IT" dirty="0" err="1"/>
+              <a:t>most</a:t>
+            </a:r>
+            <a:r>
+              <a:rPr lang="it-IT" dirty="0"/>
+              <a:t> </a:t>
+            </a:r>
+            <a:r>
+              <a:rPr lang="it-IT" dirty="0" err="1"/>
+              <a:t>important</a:t>
+            </a:r>
+            <a:r>
+              <a:rPr lang="it-IT" dirty="0"/>
+              <a:t> </a:t>
+            </a:r>
+            <a:r>
+              <a:rPr lang="it-IT" dirty="0" err="1"/>
+              <a:t>phenomena</a:t>
+            </a:r>
+            <a:r>
+              <a:rPr lang="it-IT" dirty="0"/>
+              <a:t> </a:t>
+            </a:r>
+            <a:r>
+              <a:rPr lang="it-IT" b="1" dirty="0" err="1"/>
+              <a:t>very</a:t>
+            </a:r>
+            <a:r>
+              <a:rPr lang="it-IT" b="1" dirty="0"/>
+              <a:t> </a:t>
+            </a:r>
+            <a:r>
+              <a:rPr lang="it-IT" b="1" dirty="0" err="1"/>
+              <a:t>quickly</a:t>
+            </a:r>
+            <a:br>
+              <a:rPr lang="it-IT" b="1" dirty="0"/>
+            </a:br>
+            <a:r>
+              <a:rPr lang="it-IT" b="1" dirty="0"/>
+              <a:t>After </a:t>
+            </a:r>
+            <a:r>
+              <a:rPr lang="it-IT" b="1" dirty="0" err="1"/>
+              <a:t>this</a:t>
+            </a:r>
+            <a:r>
+              <a:rPr lang="it-IT" b="1" dirty="0"/>
+              <a:t> slide, </a:t>
+            </a:r>
+            <a:r>
+              <a:rPr lang="it-IT" b="1" dirty="0" err="1"/>
+              <a:t>change</a:t>
+            </a:r>
+            <a:r>
+              <a:rPr lang="it-IT" b="1" dirty="0"/>
+              <a:t> </a:t>
+            </a:r>
+            <a:r>
+              <a:rPr lang="it-IT" b="1" dirty="0" err="1"/>
+              <a:t>person</a:t>
+            </a:r>
+            <a:r>
+              <a:rPr lang="it-IT" b="1" dirty="0"/>
+              <a:t> </a:t>
+            </a:r>
+            <a:r>
+              <a:rPr lang="it-IT" b="1" dirty="0" err="1"/>
+              <a:t>speaking</a:t>
+            </a:r>
+            <a:r>
+              <a:rPr lang="it-IT" b="1" dirty="0"/>
+              <a:t> (Saccani </a:t>
+            </a:r>
+            <a:r>
+              <a:rPr lang="it-IT" b="1" dirty="0" err="1"/>
+              <a:t>now</a:t>
+            </a:r>
+            <a:r>
+              <a:rPr lang="it-IT" b="1" dirty="0"/>
+              <a:t> </a:t>
+            </a:r>
+            <a:r>
+              <a:rPr lang="it-IT" b="1" dirty="0" err="1"/>
+              <a:t>talking</a:t>
+            </a:r>
+            <a:r>
+              <a:rPr lang="it-IT" b="1" dirty="0"/>
+              <a:t>)</a:t>
+            </a:r>
+          </a:p>
+        </p:txBody>
+      </p:sp>
+      <p:sp>
+        <p:nvSpPr>
+          <p:cNvPr id="4" name="Segnaposto numero diapositiva 3"/>
+          <p:cNvSpPr>
+            <a:spLocks noGrp="1"/>
+          </p:cNvSpPr>
+          <p:nvPr>
+            <p:ph type="sldNum" sz="quarter" idx="5"/>
+          </p:nvPr>
+        </p:nvSpPr>
+        <p:spPr/>
+        <p:txBody>
+          <a:bodyPr/>
+          <a:lstStyle/>
+          <a:p>
+            <a:fld id="{1EEEB9C4-2C44-416F-8AE9-56A3B0181F3B}" type="slidenum">
+              <a:rPr lang="it-IT" smtClean="0"/>
+              <a:t>5</a:t>
+            </a:fld>
+            <a:endParaRPr lang="it-IT"/>
+          </a:p>
+        </p:txBody>
+      </p:sp>
+    </p:spTree>
+    <p:extLst>
+      <p:ext uri="{BB962C8B-B14F-4D97-AF65-F5344CB8AC3E}">
+        <p14:creationId xmlns:p14="http://schemas.microsoft.com/office/powerpoint/2010/main" val="1196950937"/>
+      </p:ext>
+    </p:extLst>
+  </p:cSld>
+  <p:clrMapOvr>
+    <a:masterClrMapping/>
+  </p:clrMapOvr>
+</p:notes>
+</file>
+
+<file path=ppt/notesSlides/notesSlide5.xml><?xml version="1.0" encoding="utf-8"?>
+<p:notes xmlns:a="http://schemas.openxmlformats.org/drawingml/2006/main" xmlns:r="http://schemas.openxmlformats.org/officeDocument/2006/relationships" xmlns:p="http://schemas.openxmlformats.org/presentationml/2006/main">
+  <p:cSld>
+    <p:spTree>
+      <p:nvGrpSpPr>
+        <p:cNvPr id="1" name=""/>
+        <p:cNvGrpSpPr/>
+        <p:nvPr/>
+      </p:nvGrpSpPr>
+      <p:grpSpPr>
+        <a:xfrm>
+          <a:off x="0" y="0"/>
+          <a:ext cx="0" cy="0"/>
+          <a:chOff x="0" y="0"/>
+          <a:chExt cx="0" cy="0"/>
+        </a:xfrm>
+      </p:grpSpPr>
+      <p:sp>
+        <p:nvSpPr>
+          <p:cNvPr id="2" name="Segnaposto immagine diapositiva 1"/>
+          <p:cNvSpPr>
+            <a:spLocks noGrp="1" noRot="1" noChangeAspect="1"/>
+          </p:cNvSpPr>
+          <p:nvPr>
+            <p:ph type="sldImg"/>
+          </p:nvPr>
+        </p:nvSpPr>
+        <p:spPr/>
+      </p:sp>
+      <p:sp>
+        <p:nvSpPr>
+          <p:cNvPr id="3" name="Segnaposto note 2"/>
+          <p:cNvSpPr>
+            <a:spLocks noGrp="1"/>
+          </p:cNvSpPr>
+          <p:nvPr>
+            <p:ph type="body" idx="1"/>
+          </p:nvPr>
+        </p:nvSpPr>
+        <p:spPr/>
+        <p:txBody>
+          <a:bodyPr/>
+          <a:lstStyle/>
+          <a:p>
+            <a:r>
+              <a:rPr lang="it-IT" dirty="0"/>
+              <a:t>No more </a:t>
+            </a:r>
+            <a:r>
+              <a:rPr lang="it-IT" dirty="0" err="1"/>
+              <a:t>animations</a:t>
+            </a:r>
+            <a:r>
+              <a:rPr lang="it-IT" dirty="0"/>
+              <a:t> after </a:t>
+            </a:r>
+            <a:r>
+              <a:rPr lang="it-IT" dirty="0" err="1"/>
+              <a:t>purple</a:t>
+            </a:r>
+            <a:r>
+              <a:rPr lang="it-IT" dirty="0"/>
+              <a:t> </a:t>
+            </a:r>
+            <a:r>
+              <a:rPr lang="it-IT" dirty="0" err="1"/>
+              <a:t>animation</a:t>
+            </a:r>
+            <a:endParaRPr lang="it-IT" dirty="0"/>
+          </a:p>
+        </p:txBody>
+      </p:sp>
+      <p:sp>
+        <p:nvSpPr>
+          <p:cNvPr id="4" name="Segnaposto numero diapositiva 3"/>
+          <p:cNvSpPr>
+            <a:spLocks noGrp="1"/>
+          </p:cNvSpPr>
+          <p:nvPr>
+            <p:ph type="sldNum" sz="quarter" idx="5"/>
+          </p:nvPr>
+        </p:nvSpPr>
+        <p:spPr/>
+        <p:txBody>
+          <a:bodyPr/>
+          <a:lstStyle/>
+          <a:p>
+            <a:fld id="{1EEEB9C4-2C44-416F-8AE9-56A3B0181F3B}" type="slidenum">
+              <a:rPr lang="it-IT" smtClean="0"/>
+              <a:t>6</a:t>
+            </a:fld>
+            <a:endParaRPr lang="it-IT"/>
+          </a:p>
+        </p:txBody>
+      </p:sp>
+    </p:spTree>
+    <p:extLst>
+      <p:ext uri="{BB962C8B-B14F-4D97-AF65-F5344CB8AC3E}">
+        <p14:creationId xmlns:p14="http://schemas.microsoft.com/office/powerpoint/2010/main" val="3938821147"/>
+      </p:ext>
+    </p:extLst>
+  </p:cSld>
+  <p:clrMapOvr>
+    <a:masterClrMapping/>
+  </p:clrMapOvr>
+</p:notes>
+</file>
+
+<file path=ppt/notesSlides/notesSlide6.xml><?xml version="1.0" encoding="utf-8"?>
+<p:notes xmlns:a="http://schemas.openxmlformats.org/drawingml/2006/main" xmlns:r="http://schemas.openxmlformats.org/officeDocument/2006/relationships" xmlns:p="http://schemas.openxmlformats.org/presentationml/2006/main">
+  <p:cSld>
+    <p:spTree>
+      <p:nvGrpSpPr>
+        <p:cNvPr id="1" name=""/>
+        <p:cNvGrpSpPr/>
+        <p:nvPr/>
+      </p:nvGrpSpPr>
+      <p:grpSpPr>
+        <a:xfrm>
+          <a:off x="0" y="0"/>
+          <a:ext cx="0" cy="0"/>
+          <a:chOff x="0" y="0"/>
+          <a:chExt cx="0" cy="0"/>
+        </a:xfrm>
+      </p:grpSpPr>
+      <p:sp>
+        <p:nvSpPr>
+          <p:cNvPr id="2" name="Segnaposto immagine diapositiva 1"/>
+          <p:cNvSpPr>
+            <a:spLocks noGrp="1" noRot="1" noChangeAspect="1"/>
+          </p:cNvSpPr>
+          <p:nvPr>
+            <p:ph type="sldImg"/>
+          </p:nvPr>
+        </p:nvSpPr>
+        <p:spPr/>
+      </p:sp>
+      <p:sp>
+        <p:nvSpPr>
+          <p:cNvPr id="3" name="Segnaposto note 2"/>
+          <p:cNvSpPr>
+            <a:spLocks noGrp="1"/>
+          </p:cNvSpPr>
+          <p:nvPr>
+            <p:ph type="body" idx="1"/>
+          </p:nvPr>
+        </p:nvSpPr>
+        <p:spPr/>
+        <p:txBody>
+          <a:bodyPr/>
+          <a:lstStyle/>
+          <a:p>
+            <a:r>
+              <a:rPr lang="it-IT" dirty="0"/>
+              <a:t>First </a:t>
+            </a:r>
+            <a:r>
+              <a:rPr lang="it-IT" dirty="0" err="1"/>
+              <a:t>animation</a:t>
+            </a:r>
+            <a:r>
+              <a:rPr lang="it-IT" dirty="0"/>
+              <a:t>: red </a:t>
+            </a:r>
+            <a:r>
+              <a:rPr lang="it-IT" dirty="0" err="1"/>
+              <a:t>circles</a:t>
+            </a:r>
+            <a:r>
+              <a:rPr lang="it-IT" dirty="0"/>
+              <a:t> </a:t>
+            </a:r>
+            <a:r>
+              <a:rPr lang="it-IT" dirty="0" err="1"/>
+              <a:t>wrt</a:t>
+            </a:r>
+            <a:r>
+              <a:rPr lang="it-IT" dirty="0"/>
+              <a:t> </a:t>
+            </a:r>
+            <a:r>
+              <a:rPr lang="it-IT" dirty="0" err="1"/>
+              <a:t>previus</a:t>
+            </a:r>
+            <a:r>
+              <a:rPr lang="it-IT" dirty="0"/>
+              <a:t> </a:t>
+            </a:r>
+            <a:r>
+              <a:rPr lang="it-IT" dirty="0" err="1"/>
+              <a:t>important</a:t>
+            </a:r>
+            <a:r>
+              <a:rPr lang="it-IT" dirty="0"/>
+              <a:t> </a:t>
+            </a:r>
+            <a:r>
+              <a:rPr lang="it-IT" dirty="0" err="1"/>
+              <a:t>requirements</a:t>
+            </a:r>
+            <a:r>
+              <a:rPr lang="it-IT" dirty="0"/>
+              <a:t> </a:t>
+            </a:r>
+            <a:br>
+              <a:rPr lang="it-IT" dirty="0"/>
+            </a:br>
+            <a:r>
+              <a:rPr lang="it-IT" dirty="0"/>
+              <a:t>Second </a:t>
+            </a:r>
+            <a:r>
+              <a:rPr lang="it-IT" dirty="0" err="1"/>
+              <a:t>animation</a:t>
+            </a:r>
+            <a:r>
+              <a:rPr lang="it-IT" dirty="0"/>
+              <a:t>: </a:t>
+            </a:r>
+            <a:r>
+              <a:rPr lang="it-IT" dirty="0" err="1"/>
+              <a:t>obvious</a:t>
+            </a:r>
+            <a:r>
+              <a:rPr lang="it-IT" dirty="0"/>
+              <a:t> R1 </a:t>
+            </a:r>
+            <a:r>
+              <a:rPr lang="it-IT" dirty="0" err="1"/>
+              <a:t>requirments</a:t>
+            </a:r>
+            <a:r>
+              <a:rPr lang="it-IT" dirty="0"/>
+              <a:t> to </a:t>
+            </a:r>
+            <a:r>
+              <a:rPr lang="it-IT" dirty="0" err="1"/>
+              <a:t>allow</a:t>
+            </a:r>
+            <a:r>
+              <a:rPr lang="it-IT" dirty="0"/>
+              <a:t> </a:t>
+            </a:r>
+            <a:r>
+              <a:rPr lang="it-IT" dirty="0" err="1"/>
+              <a:t>students</a:t>
+            </a:r>
+            <a:r>
+              <a:rPr lang="it-IT" dirty="0"/>
+              <a:t> to log in </a:t>
+            </a:r>
+          </a:p>
+        </p:txBody>
+      </p:sp>
+      <p:sp>
+        <p:nvSpPr>
+          <p:cNvPr id="4" name="Segnaposto numero diapositiva 3"/>
+          <p:cNvSpPr>
+            <a:spLocks noGrp="1"/>
+          </p:cNvSpPr>
+          <p:nvPr>
+            <p:ph type="sldNum" sz="quarter" idx="5"/>
+          </p:nvPr>
+        </p:nvSpPr>
+        <p:spPr/>
+        <p:txBody>
+          <a:bodyPr/>
+          <a:lstStyle/>
+          <a:p>
+            <a:fld id="{1EEEB9C4-2C44-416F-8AE9-56A3B0181F3B}" type="slidenum">
+              <a:rPr lang="it-IT" smtClean="0"/>
+              <a:t>8</a:t>
+            </a:fld>
+            <a:endParaRPr lang="it-IT"/>
+          </a:p>
+        </p:txBody>
+      </p:sp>
+    </p:spTree>
+    <p:extLst>
+      <p:ext uri="{BB962C8B-B14F-4D97-AF65-F5344CB8AC3E}">
+        <p14:creationId xmlns:p14="http://schemas.microsoft.com/office/powerpoint/2010/main" val="1731093520"/>
+      </p:ext>
+    </p:extLst>
+  </p:cSld>
+  <p:clrMapOvr>
+    <a:masterClrMapping/>
+  </p:clrMapOvr>
+</p:notes>
+</file>
+
+<file path=ppt/notesSlides/notesSlide7.xml><?xml version="1.0" encoding="utf-8"?>
+<p:notes xmlns:a="http://schemas.openxmlformats.org/drawingml/2006/main" xmlns:r="http://schemas.openxmlformats.org/officeDocument/2006/relationships" xmlns:p="http://schemas.openxmlformats.org/presentationml/2006/main">
+  <p:cSld>
+    <p:spTree>
+      <p:nvGrpSpPr>
+        <p:cNvPr id="1" name=""/>
+        <p:cNvGrpSpPr/>
+        <p:nvPr/>
+      </p:nvGrpSpPr>
+      <p:grpSpPr>
+        <a:xfrm>
+          <a:off x="0" y="0"/>
+          <a:ext cx="0" cy="0"/>
+          <a:chOff x="0" y="0"/>
+          <a:chExt cx="0" cy="0"/>
+        </a:xfrm>
+      </p:grpSpPr>
+      <p:sp>
+        <p:nvSpPr>
+          <p:cNvPr id="2" name="Segnaposto immagine diapositiva 1"/>
+          <p:cNvSpPr>
+            <a:spLocks noGrp="1" noRot="1" noChangeAspect="1"/>
+          </p:cNvSpPr>
+          <p:nvPr>
+            <p:ph type="sldImg"/>
+          </p:nvPr>
+        </p:nvSpPr>
+        <p:spPr/>
+      </p:sp>
+      <p:sp>
+        <p:nvSpPr>
+          <p:cNvPr id="3" name="Segnaposto note 2"/>
+          <p:cNvSpPr>
+            <a:spLocks noGrp="1"/>
+          </p:cNvSpPr>
+          <p:nvPr>
+            <p:ph type="body" idx="1"/>
+          </p:nvPr>
+        </p:nvSpPr>
+        <p:spPr/>
+        <p:txBody>
+          <a:bodyPr/>
+          <a:lstStyle/>
+          <a:p>
+            <a:r>
+              <a:rPr lang="it-IT" dirty="0"/>
+              <a:t>After </a:t>
+            </a:r>
+            <a:r>
+              <a:rPr lang="it-IT" dirty="0" err="1"/>
+              <a:t>this</a:t>
+            </a:r>
+            <a:r>
+              <a:rPr lang="it-IT" dirty="0"/>
+              <a:t> slide </a:t>
+            </a:r>
+            <a:r>
+              <a:rPr lang="it-IT" b="1" dirty="0" err="1"/>
+              <a:t>change</a:t>
+            </a:r>
+            <a:r>
+              <a:rPr lang="it-IT" b="1" dirty="0"/>
+              <a:t> </a:t>
+            </a:r>
+            <a:r>
+              <a:rPr lang="it-IT" b="1" dirty="0" err="1"/>
+              <a:t>person</a:t>
+            </a:r>
+            <a:r>
+              <a:rPr lang="it-IT" b="1" dirty="0"/>
+              <a:t> </a:t>
+            </a:r>
+            <a:r>
+              <a:rPr lang="it-IT" b="1" dirty="0" err="1"/>
+              <a:t>speaking</a:t>
+            </a:r>
+            <a:r>
+              <a:rPr lang="it-IT" b="1" dirty="0"/>
+              <a:t> (</a:t>
+            </a:r>
+            <a:r>
+              <a:rPr lang="it-IT" b="1" dirty="0" err="1"/>
+              <a:t>Ferlin</a:t>
+            </a:r>
+            <a:r>
+              <a:rPr lang="it-IT" b="1" dirty="0"/>
+              <a:t> </a:t>
+            </a:r>
+            <a:r>
+              <a:rPr lang="it-IT" b="1" dirty="0" err="1"/>
+              <a:t>now</a:t>
+            </a:r>
+            <a:r>
+              <a:rPr lang="it-IT" b="1" dirty="0"/>
+              <a:t> </a:t>
+            </a:r>
+            <a:r>
+              <a:rPr lang="it-IT" b="1" dirty="0" err="1"/>
+              <a:t>talking</a:t>
+            </a:r>
+            <a:r>
+              <a:rPr lang="it-IT" b="1" dirty="0"/>
+              <a:t>)</a:t>
+            </a:r>
+          </a:p>
+        </p:txBody>
+      </p:sp>
+      <p:sp>
+        <p:nvSpPr>
+          <p:cNvPr id="4" name="Segnaposto numero diapositiva 3"/>
+          <p:cNvSpPr>
+            <a:spLocks noGrp="1"/>
+          </p:cNvSpPr>
+          <p:nvPr>
+            <p:ph type="sldNum" sz="quarter" idx="5"/>
+          </p:nvPr>
+        </p:nvSpPr>
+        <p:spPr/>
+        <p:txBody>
+          <a:bodyPr/>
+          <a:lstStyle/>
+          <a:p>
+            <a:fld id="{1EEEB9C4-2C44-416F-8AE9-56A3B0181F3B}" type="slidenum">
+              <a:rPr lang="it-IT" smtClean="0"/>
+              <a:t>9</a:t>
+            </a:fld>
+            <a:endParaRPr lang="it-IT"/>
+          </a:p>
+        </p:txBody>
+      </p:sp>
+    </p:spTree>
+    <p:extLst>
+      <p:ext uri="{BB962C8B-B14F-4D97-AF65-F5344CB8AC3E}">
+        <p14:creationId xmlns:p14="http://schemas.microsoft.com/office/powerpoint/2010/main" val="1984787346"/>
+      </p:ext>
+    </p:extLst>
+  </p:cSld>
+  <p:clrMapOvr>
+    <a:masterClrMapping/>
+  </p:clrMapOvr>
+</p:notes>
+</file>
+
+<file path=ppt/notesSlides/notesSlide8.xml><?xml version="1.0" encoding="utf-8"?>
+<p:notes xmlns:a="http://schemas.openxmlformats.org/drawingml/2006/main" xmlns:r="http://schemas.openxmlformats.org/officeDocument/2006/relationships" xmlns:p="http://schemas.openxmlformats.org/presentationml/2006/main">
+  <p:cSld>
+    <p:spTree>
+      <p:nvGrpSpPr>
+        <p:cNvPr id="1" name=""/>
+        <p:cNvGrpSpPr/>
+        <p:nvPr/>
+      </p:nvGrpSpPr>
+      <p:grpSpPr>
+        <a:xfrm>
+          <a:off x="0" y="0"/>
+          <a:ext cx="0" cy="0"/>
+          <a:chOff x="0" y="0"/>
+          <a:chExt cx="0" cy="0"/>
+        </a:xfrm>
+      </p:grpSpPr>
+      <p:sp>
+        <p:nvSpPr>
+          <p:cNvPr id="2" name="Segnaposto immagine diapositiva 1"/>
+          <p:cNvSpPr>
+            <a:spLocks noGrp="1" noRot="1" noChangeAspect="1"/>
+          </p:cNvSpPr>
+          <p:nvPr>
+            <p:ph type="sldImg"/>
+          </p:nvPr>
+        </p:nvSpPr>
+        <p:spPr/>
+      </p:sp>
+      <p:sp>
+        <p:nvSpPr>
+          <p:cNvPr id="3" name="Segnaposto note 2"/>
+          <p:cNvSpPr>
+            <a:spLocks noGrp="1"/>
+          </p:cNvSpPr>
+          <p:nvPr>
+            <p:ph type="body" idx="1"/>
+          </p:nvPr>
+        </p:nvSpPr>
+        <p:spPr/>
+        <p:txBody>
+          <a:bodyPr/>
+          <a:lstStyle/>
+          <a:p>
+            <a:r>
+              <a:rPr lang="it-IT" dirty="0" err="1"/>
+              <a:t>Now</a:t>
+            </a:r>
+            <a:r>
+              <a:rPr lang="it-IT" dirty="0"/>
+              <a:t> </a:t>
+            </a:r>
+            <a:r>
+              <a:rPr lang="it-IT" dirty="0" err="1"/>
+              <a:t>we</a:t>
+            </a:r>
+            <a:r>
+              <a:rPr lang="it-IT" dirty="0"/>
+              <a:t> can </a:t>
+            </a:r>
+            <a:r>
+              <a:rPr lang="it-IT" dirty="0" err="1"/>
+              <a:t>also</a:t>
+            </a:r>
+            <a:r>
+              <a:rPr lang="it-IT" dirty="0"/>
+              <a:t> show the Class </a:t>
+            </a:r>
+            <a:r>
+              <a:rPr lang="it-IT" dirty="0" err="1"/>
+              <a:t>Diagram</a:t>
+            </a:r>
+            <a:r>
+              <a:rPr lang="it-IT" dirty="0"/>
+              <a:t> and </a:t>
+            </a:r>
+            <a:r>
+              <a:rPr lang="it-IT" dirty="0" err="1"/>
+              <a:t>say</a:t>
+            </a:r>
+            <a:r>
+              <a:rPr lang="it-IT" dirty="0"/>
+              <a:t> </a:t>
+            </a:r>
+            <a:r>
+              <a:rPr lang="it-IT" dirty="0" err="1"/>
+              <a:t>that</a:t>
+            </a:r>
+            <a:r>
+              <a:rPr lang="it-IT" dirty="0"/>
+              <a:t> </a:t>
+            </a:r>
+            <a:r>
+              <a:rPr lang="it-IT" dirty="0" err="1"/>
+              <a:t>we</a:t>
+            </a:r>
+            <a:r>
+              <a:rPr lang="it-IT" dirty="0"/>
+              <a:t> </a:t>
+            </a:r>
+            <a:r>
+              <a:rPr lang="it-IT" dirty="0" err="1"/>
+              <a:t>translated</a:t>
+            </a:r>
+            <a:r>
+              <a:rPr lang="it-IT" dirty="0"/>
+              <a:t> </a:t>
+            </a:r>
+            <a:r>
+              <a:rPr lang="it-IT" dirty="0" err="1"/>
+              <a:t>all</a:t>
+            </a:r>
+            <a:r>
+              <a:rPr lang="it-IT" dirty="0"/>
+              <a:t> the </a:t>
+            </a:r>
+            <a:r>
+              <a:rPr lang="it-IT" dirty="0" err="1"/>
+              <a:t>elements</a:t>
+            </a:r>
+            <a:r>
+              <a:rPr lang="it-IT" dirty="0"/>
+              <a:t> in the </a:t>
+            </a:r>
+            <a:r>
+              <a:rPr lang="it-IT" dirty="0" err="1"/>
+              <a:t>Alloy</a:t>
+            </a:r>
+            <a:r>
+              <a:rPr lang="it-IT" dirty="0"/>
+              <a:t> Code</a:t>
+            </a:r>
+          </a:p>
+        </p:txBody>
+      </p:sp>
+      <p:sp>
+        <p:nvSpPr>
+          <p:cNvPr id="4" name="Segnaposto numero diapositiva 3"/>
+          <p:cNvSpPr>
+            <a:spLocks noGrp="1"/>
+          </p:cNvSpPr>
+          <p:nvPr>
+            <p:ph type="sldNum" sz="quarter" idx="5"/>
+          </p:nvPr>
+        </p:nvSpPr>
+        <p:spPr/>
+        <p:txBody>
+          <a:bodyPr/>
+          <a:lstStyle/>
+          <a:p>
+            <a:fld id="{1EEEB9C4-2C44-416F-8AE9-56A3B0181F3B}" type="slidenum">
+              <a:rPr lang="it-IT" smtClean="0"/>
+              <a:t>10</a:t>
+            </a:fld>
+            <a:endParaRPr lang="it-IT"/>
+          </a:p>
+        </p:txBody>
+      </p:sp>
+    </p:spTree>
+    <p:extLst>
+      <p:ext uri="{BB962C8B-B14F-4D97-AF65-F5344CB8AC3E}">
+        <p14:creationId xmlns:p14="http://schemas.microsoft.com/office/powerpoint/2010/main" val="2352873539"/>
+      </p:ext>
+    </p:extLst>
+  </p:cSld>
+  <p:clrMapOvr>
+    <a:masterClrMapping/>
+  </p:clrMapOvr>
+</p:notes>
+</file>
+
+<file path=ppt/notesSlides/notesSlide9.xml><?xml version="1.0" encoding="utf-8"?>
+<p:notes xmlns:a="http://schemas.openxmlformats.org/drawingml/2006/main" xmlns:r="http://schemas.openxmlformats.org/officeDocument/2006/relationships" xmlns:p="http://schemas.openxmlformats.org/presentationml/2006/main">
+  <p:cSld>
+    <p:spTree>
+      <p:nvGrpSpPr>
+        <p:cNvPr id="1" name=""/>
+        <p:cNvGrpSpPr/>
+        <p:nvPr/>
+      </p:nvGrpSpPr>
+      <p:grpSpPr>
+        <a:xfrm>
+          <a:off x="0" y="0"/>
+          <a:ext cx="0" cy="0"/>
+          <a:chOff x="0" y="0"/>
+          <a:chExt cx="0" cy="0"/>
+        </a:xfrm>
+      </p:grpSpPr>
+      <p:sp>
+        <p:nvSpPr>
+          <p:cNvPr id="2" name="Segnaposto immagine diapositiva 1"/>
+          <p:cNvSpPr>
+            <a:spLocks noGrp="1" noRot="1" noChangeAspect="1"/>
+          </p:cNvSpPr>
+          <p:nvPr>
+            <p:ph type="sldImg"/>
+          </p:nvPr>
+        </p:nvSpPr>
+        <p:spPr/>
+      </p:sp>
+      <p:sp>
+        <p:nvSpPr>
+          <p:cNvPr id="3" name="Segnaposto note 2"/>
+          <p:cNvSpPr>
+            <a:spLocks noGrp="1"/>
+          </p:cNvSpPr>
+          <p:nvPr>
+            <p:ph type="body" idx="1"/>
+          </p:nvPr>
+        </p:nvSpPr>
+        <p:spPr/>
+        <p:txBody>
+          <a:bodyPr/>
+          <a:lstStyle/>
+          <a:p>
+            <a:r>
+              <a:rPr lang="it-IT" dirty="0" err="1"/>
+              <a:t>This</a:t>
+            </a:r>
+            <a:r>
+              <a:rPr lang="it-IT" dirty="0"/>
+              <a:t> show some </a:t>
+            </a:r>
+            <a:r>
+              <a:rPr lang="it-IT" dirty="0" err="1"/>
+              <a:t>important</a:t>
+            </a:r>
+            <a:r>
+              <a:rPr lang="it-IT" dirty="0"/>
+              <a:t> </a:t>
+            </a:r>
+            <a:r>
+              <a:rPr lang="it-IT" dirty="0" err="1"/>
+              <a:t>properties</a:t>
+            </a:r>
+            <a:r>
+              <a:rPr lang="it-IT" dirty="0"/>
+              <a:t> like the </a:t>
+            </a:r>
+            <a:r>
+              <a:rPr lang="it-IT" dirty="0" err="1"/>
+              <a:t>invitation</a:t>
+            </a:r>
+            <a:r>
+              <a:rPr lang="it-IT" dirty="0"/>
+              <a:t> part (</a:t>
+            </a:r>
+            <a:r>
+              <a:rPr lang="it-IT" dirty="0" err="1"/>
+              <a:t>discussed</a:t>
+            </a:r>
+            <a:r>
+              <a:rPr lang="it-IT" dirty="0"/>
+              <a:t> more in </a:t>
+            </a:r>
+            <a:r>
+              <a:rPr lang="it-IT" dirty="0" err="1"/>
+              <a:t>detail</a:t>
+            </a:r>
+            <a:r>
+              <a:rPr lang="it-IT" dirty="0"/>
+              <a:t> with code in the </a:t>
+            </a:r>
+            <a:r>
+              <a:rPr lang="it-IT" dirty="0" err="1"/>
+              <a:t>next</a:t>
+            </a:r>
+            <a:r>
+              <a:rPr lang="it-IT" dirty="0"/>
+              <a:t> slide)</a:t>
+            </a:r>
+          </a:p>
+        </p:txBody>
+      </p:sp>
+      <p:sp>
+        <p:nvSpPr>
+          <p:cNvPr id="4" name="Segnaposto numero diapositiva 3"/>
+          <p:cNvSpPr>
+            <a:spLocks noGrp="1"/>
+          </p:cNvSpPr>
+          <p:nvPr>
+            <p:ph type="sldNum" sz="quarter" idx="5"/>
+          </p:nvPr>
+        </p:nvSpPr>
+        <p:spPr/>
+        <p:txBody>
+          <a:bodyPr/>
+          <a:lstStyle/>
+          <a:p>
+            <a:fld id="{1EEEB9C4-2C44-416F-8AE9-56A3B0181F3B}" type="slidenum">
+              <a:rPr lang="it-IT" smtClean="0"/>
+              <a:t>11</a:t>
+            </a:fld>
+            <a:endParaRPr lang="it-IT"/>
+          </a:p>
+        </p:txBody>
+      </p:sp>
+    </p:spTree>
+    <p:extLst>
+      <p:ext uri="{BB962C8B-B14F-4D97-AF65-F5344CB8AC3E}">
+        <p14:creationId xmlns:p14="http://schemas.microsoft.com/office/powerpoint/2010/main" val="2039253520"/>
       </p:ext>
     </p:extLst>
   </p:cSld>
@@ -9820,7 +11158,7 @@
           <p:nvPr/>
         </p:nvPicPr>
         <p:blipFill rotWithShape="1">
-          <a:blip r:embed="rId2" cstate="print">
+          <a:blip r:embed="rId3" cstate="print">
             <a:extLst>
               <a:ext uri="{28A0092B-C50C-407E-A947-70E740481C1C}">
                 <a14:useLocalDpi xmlns:a14="http://schemas.microsoft.com/office/drawing/2010/main" val="0"/>
@@ -11215,13 +12553,13 @@
           <p:nvPr/>
         </p:nvPicPr>
         <p:blipFill>
-          <a:blip r:embed="rId2">
+          <a:blip r:embed="rId3">
             <a:extLst>
               <a:ext uri="{28A0092B-C50C-407E-A947-70E740481C1C}">
                 <a14:useLocalDpi xmlns:a14="http://schemas.microsoft.com/office/drawing/2010/main" val="0"/>
               </a:ext>
               <a:ext uri="{96DAC541-7B7A-43D3-8B79-37D633B846F1}">
-                <asvg:svgBlip xmlns:asvg="http://schemas.microsoft.com/office/drawing/2016/SVG/main" r:embed="rId3"/>
+                <asvg:svgBlip xmlns:asvg="http://schemas.microsoft.com/office/drawing/2016/SVG/main" r:embed="rId4"/>
               </a:ext>
             </a:extLst>
           </a:blip>
@@ -11388,7 +12726,7 @@
           <p:nvPr/>
         </p:nvPicPr>
         <p:blipFill>
-          <a:blip r:embed="rId2">
+          <a:blip r:embed="rId3">
             <a:extLst>
               <a:ext uri="{28A0092B-C50C-407E-A947-70E740481C1C}">
                 <a14:useLocalDpi xmlns:a14="http://schemas.microsoft.com/office/drawing/2010/main" val="0"/>
@@ -11424,7 +12762,7 @@
           <p:nvPr/>
         </p:nvPicPr>
         <p:blipFill>
-          <a:blip r:embed="rId3">
+          <a:blip r:embed="rId4">
             <a:extLst>
               <a:ext uri="{28A0092B-C50C-407E-A947-70E740481C1C}">
                 <a14:useLocalDpi xmlns:a14="http://schemas.microsoft.com/office/drawing/2010/main" val="0"/>
@@ -11594,7 +12932,7 @@
           <p:nvPr/>
         </p:nvPicPr>
         <p:blipFill>
-          <a:blip r:embed="rId2">
+          <a:blip r:embed="rId3">
             <a:extLst>
               <a:ext uri="{28A0092B-C50C-407E-A947-70E740481C1C}">
                 <a14:useLocalDpi xmlns:a14="http://schemas.microsoft.com/office/drawing/2010/main" val="0"/>
@@ -11630,7 +12968,7 @@
           <p:nvPr/>
         </p:nvPicPr>
         <p:blipFill>
-          <a:blip r:embed="rId3">
+          <a:blip r:embed="rId4">
             <a:extLst>
               <a:ext uri="{28A0092B-C50C-407E-A947-70E740481C1C}">
                 <a14:useLocalDpi xmlns:a14="http://schemas.microsoft.com/office/drawing/2010/main" val="0"/>
@@ -17364,7 +18702,7 @@
           <p:nvPr/>
         </p:nvPicPr>
         <p:blipFill>
-          <a:blip r:embed="rId2">
+          <a:blip r:embed="rId3">
             <a:extLst>
               <a:ext uri="{28A0092B-C50C-407E-A947-70E740481C1C}">
                 <a14:useLocalDpi xmlns:a14="http://schemas.microsoft.com/office/drawing/2010/main" val="0"/>
@@ -17841,13 +19179,13 @@
           <p:nvPr/>
         </p:nvPicPr>
         <p:blipFill>
-          <a:blip r:embed="rId3">
+          <a:blip r:embed="rId4">
             <a:extLst>
               <a:ext uri="{28A0092B-C50C-407E-A947-70E740481C1C}">
                 <a14:useLocalDpi xmlns:a14="http://schemas.microsoft.com/office/drawing/2010/main" val="0"/>
               </a:ext>
               <a:ext uri="{96DAC541-7B7A-43D3-8B79-37D633B846F1}">
-                <asvg:svgBlip xmlns:asvg="http://schemas.microsoft.com/office/drawing/2016/SVG/main" r:embed="rId4"/>
+                <asvg:svgBlip xmlns:asvg="http://schemas.microsoft.com/office/drawing/2016/SVG/main" r:embed="rId5"/>
               </a:ext>
             </a:extLst>
           </a:blip>
@@ -19271,7 +20609,7 @@
           <p:nvPr/>
         </p:nvPicPr>
         <p:blipFill>
-          <a:blip r:embed="rId2">
+          <a:blip r:embed="rId3">
             <a:extLst>
               <a:ext uri="{28A0092B-C50C-407E-A947-70E740481C1C}">
                 <a14:useLocalDpi xmlns:a14="http://schemas.microsoft.com/office/drawing/2010/main" val="0"/>

</xml_diff>

<commit_message>
Added some comments in presentation
</commit_message>
<xml_diff>
--- a/presentation/Presentation - Ferlin Orsenigo Saccani.pptx
+++ b/presentation/Presentation - Ferlin Orsenigo Saccani.pptx
@@ -7319,52 +7319,56 @@
               <a:t> the Build and Test Service </a:t>
             </a:r>
             <a:r>
-              <a:rPr lang="it-IT" dirty="0" err="1"/>
+              <a:rPr lang="it-IT" b="1" dirty="0" err="1"/>
               <a:t>we</a:t>
             </a:r>
             <a:r>
+              <a:rPr lang="it-IT" b="1" dirty="0"/>
+              <a:t> </a:t>
+            </a:r>
+            <a:r>
+              <a:rPr lang="it-IT" b="1" dirty="0" err="1"/>
+              <a:t>decided</a:t>
+            </a:r>
+            <a:r>
+              <a:rPr lang="it-IT" b="1" dirty="0"/>
+              <a:t> to </a:t>
+            </a:r>
+            <a:r>
+              <a:rPr lang="it-IT" b="1" dirty="0" err="1"/>
+              <a:t>adopt</a:t>
+            </a:r>
+            <a:r>
+              <a:rPr lang="it-IT" b="1" dirty="0"/>
+              <a:t> and </a:t>
+            </a:r>
+            <a:r>
+              <a:rPr lang="it-IT" b="1" dirty="0" err="1"/>
+              <a:t>already</a:t>
+            </a:r>
+            <a:r>
+              <a:rPr lang="it-IT" b="1" dirty="0"/>
+              <a:t> </a:t>
+            </a:r>
+            <a:r>
+              <a:rPr lang="it-IT" b="1" dirty="0" err="1"/>
+              <a:t>existing</a:t>
+            </a:r>
+            <a:r>
+              <a:rPr lang="it-IT" b="1" dirty="0"/>
+              <a:t> system </a:t>
+            </a:r>
+            <a:r>
+              <a:rPr lang="it-IT" b="1" dirty="0" err="1"/>
+              <a:t>called</a:t>
+            </a:r>
+            <a:r>
+              <a:rPr lang="it-IT" b="1" dirty="0"/>
+              <a:t> Jenkins</a:t>
+            </a:r>
+            <a:r>
               <a:rPr lang="it-IT" dirty="0"/>
-              <a:t> </a:t>
-            </a:r>
-            <a:r>
-              <a:rPr lang="it-IT" dirty="0" err="1"/>
-              <a:t>decided</a:t>
-            </a:r>
-            <a:r>
-              <a:rPr lang="it-IT" dirty="0"/>
-              <a:t> to </a:t>
-            </a:r>
-            <a:r>
-              <a:rPr lang="it-IT" dirty="0" err="1"/>
-              <a:t>adopt</a:t>
-            </a:r>
-            <a:r>
-              <a:rPr lang="it-IT" dirty="0"/>
-              <a:t> and </a:t>
-            </a:r>
-            <a:r>
-              <a:rPr lang="it-IT" dirty="0" err="1"/>
-              <a:t>already</a:t>
-            </a:r>
-            <a:r>
-              <a:rPr lang="it-IT" dirty="0"/>
-              <a:t> </a:t>
-            </a:r>
-            <a:r>
-              <a:rPr lang="it-IT" dirty="0" err="1"/>
-              <a:t>existing</a:t>
-            </a:r>
-            <a:r>
-              <a:rPr lang="it-IT" dirty="0"/>
-              <a:t> system </a:t>
-            </a:r>
-            <a:r>
-              <a:rPr lang="it-IT" dirty="0" err="1"/>
-              <a:t>called</a:t>
-            </a:r>
-            <a:r>
-              <a:rPr lang="it-IT" dirty="0"/>
-              <a:t> Jenkins.</a:t>
+              <a:t>.</a:t>
             </a:r>
             <a:br>
               <a:rPr lang="it-IT" dirty="0"/>
@@ -7383,11 +7387,39 @@
             </a:r>
             <a:r>
               <a:rPr lang="it-IT" dirty="0"/>
-              <a:t> </a:t>
+              <a:t> Jenkins </a:t>
             </a:r>
             <a:r>
               <a:rPr lang="it-IT" dirty="0" err="1"/>
-              <a:t>it</a:t>
+              <a:t>already</a:t>
+            </a:r>
+            <a:r>
+              <a:rPr lang="it-IT" dirty="0"/>
+              <a:t> supports (</a:t>
+            </a:r>
+            <a:r>
+              <a:rPr lang="it-IT" dirty="0">
+                <a:solidFill>
+                  <a:srgbClr val="FF0000"/>
+                </a:solidFill>
+              </a:rPr>
+              <a:t>with plugins</a:t>
+            </a:r>
+            <a:r>
+              <a:rPr lang="it-IT" dirty="0"/>
+              <a:t>) </a:t>
+            </a:r>
+            <a:r>
+              <a:rPr lang="it-IT" dirty="0" err="1"/>
+              <a:t>most</a:t>
+            </a:r>
+            <a:r>
+              <a:rPr lang="it-IT" dirty="0"/>
+              <a:t> of the programming </a:t>
+            </a:r>
+            <a:r>
+              <a:rPr lang="it-IT" dirty="0" err="1"/>
+              <a:t>languages</a:t>
             </a:r>
             <a:r>
               <a:rPr lang="it-IT" dirty="0"/>
@@ -7395,23 +7427,7 @@
             </a:r>
             <a:r>
               <a:rPr lang="it-IT" dirty="0" err="1"/>
-              <a:t>already</a:t>
-            </a:r>
-            <a:r>
-              <a:rPr lang="it-IT" dirty="0"/>
-              <a:t> supports (with plugins) </a:t>
-            </a:r>
-            <a:r>
-              <a:rPr lang="it-IT" dirty="0" err="1"/>
-              <a:t>most</a:t>
-            </a:r>
-            <a:r>
-              <a:rPr lang="it-IT" dirty="0"/>
-              <a:t> of the programming </a:t>
-            </a:r>
-            <a:r>
-              <a:rPr lang="it-IT" dirty="0" err="1"/>
-              <a:t>languages</a:t>
+              <a:t>that</a:t>
             </a:r>
             <a:r>
               <a:rPr lang="it-IT" dirty="0"/>
@@ -7419,7 +7435,7 @@
             </a:r>
             <a:r>
               <a:rPr lang="it-IT" dirty="0" err="1"/>
-              <a:t>that</a:t>
+              <a:t>might</a:t>
             </a:r>
             <a:r>
               <a:rPr lang="it-IT" dirty="0"/>
@@ -7427,7 +7443,7 @@
             </a:r>
             <a:r>
               <a:rPr lang="it-IT" dirty="0" err="1"/>
-              <a:t>might</a:t>
+              <a:t>get</a:t>
             </a:r>
             <a:r>
               <a:rPr lang="it-IT" dirty="0"/>
@@ -7435,27 +7451,97 @@
             </a:r>
             <a:r>
               <a:rPr lang="it-IT" dirty="0" err="1"/>
-              <a:t>get</a:t>
+              <a:t>used</a:t>
+            </a:r>
+            <a:r>
+              <a:rPr lang="it-IT" dirty="0"/>
+              <a:t> in </a:t>
+            </a:r>
+            <a:r>
+              <a:rPr lang="it-IT" dirty="0" err="1"/>
+              <a:t>battles</a:t>
+            </a:r>
+            <a:r>
+              <a:rPr lang="it-IT" dirty="0"/>
+              <a:t>.</a:t>
+            </a:r>
+            <a:br>
+              <a:rPr lang="it-IT" dirty="0"/>
+            </a:br>
+            <a:endParaRPr lang="it-IT" dirty="0"/>
+          </a:p>
+          <a:p>
+            <a:pPr marL="228600" indent="-228600">
+              <a:buFont typeface="+mj-lt"/>
+              <a:buAutoNum type="arabicPeriod"/>
+            </a:pPr>
+            <a:r>
+              <a:rPr lang="it-IT" dirty="0" err="1"/>
+              <a:t>Additionally</a:t>
             </a:r>
             <a:r>
               <a:rPr lang="it-IT" dirty="0"/>
               <a:t> </a:t>
             </a:r>
             <a:r>
+              <a:rPr lang="it-IT" b="1" dirty="0" err="1"/>
+              <a:t>it</a:t>
+            </a:r>
+            <a:r>
+              <a:rPr lang="it-IT" b="1" dirty="0"/>
+              <a:t> </a:t>
+            </a:r>
+            <a:r>
+              <a:rPr lang="it-IT" b="1" dirty="0" err="1"/>
+              <a:t>already</a:t>
+            </a:r>
+            <a:r>
+              <a:rPr lang="it-IT" b="1" dirty="0"/>
+              <a:t> </a:t>
+            </a:r>
+            <a:r>
+              <a:rPr lang="it-IT" b="1" dirty="0" err="1"/>
+              <a:t>implements</a:t>
+            </a:r>
+            <a:r>
+              <a:rPr lang="it-IT" b="1" dirty="0"/>
+              <a:t> an </a:t>
+            </a:r>
+            <a:r>
+              <a:rPr lang="it-IT" b="1" dirty="0" err="1"/>
+              <a:t>internal</a:t>
+            </a:r>
+            <a:r>
+              <a:rPr lang="it-IT" b="1" dirty="0"/>
+              <a:t> </a:t>
+            </a:r>
+            <a:r>
+              <a:rPr lang="it-IT" b="1" dirty="0" err="1"/>
+              <a:t>queue</a:t>
+            </a:r>
+            <a:r>
+              <a:rPr lang="it-IT" b="1" dirty="0"/>
+              <a:t> </a:t>
+            </a:r>
+            <a:r>
+              <a:rPr lang="it-IT" dirty="0"/>
+              <a:t>(</a:t>
+            </a:r>
+            <a:r>
               <a:rPr lang="it-IT" dirty="0" err="1"/>
-              <a:t>used</a:t>
+              <a:t>allowing</a:t>
             </a:r>
             <a:r>
               <a:rPr lang="it-IT" dirty="0"/>
-              <a:t> in </a:t>
+              <a:t> </a:t>
             </a:r>
             <a:r>
               <a:rPr lang="it-IT" dirty="0" err="1"/>
-              <a:t>battles</a:t>
+              <a:t>async</a:t>
             </a:r>
             <a:r>
               <a:rPr lang="it-IT" dirty="0"/>
-              <a:t>.</a:t>
+              <a:t> interaction) </a:t>
             </a:r>
             <a:br>
               <a:rPr lang="it-IT" dirty="0"/>
@@ -7464,76 +7550,54 @@
               <a:rPr lang="it-IT" dirty="0"/>
             </a:br>
             <a:r>
+              <a:rPr lang="it-IT" dirty="0"/>
+              <a:t>and </a:t>
+            </a:r>
+            <a:br>
+              <a:rPr lang="it-IT" dirty="0"/>
+            </a:br>
+            <a:endParaRPr lang="it-IT" dirty="0"/>
+          </a:p>
+          <a:p>
+            <a:pPr marL="228600" indent="-228600">
+              <a:buFont typeface="+mj-lt"/>
+              <a:buAutoNum type="arabicPeriod"/>
+            </a:pPr>
+            <a:r>
+              <a:rPr lang="it-IT" dirty="0"/>
+              <a:t>can </a:t>
+            </a:r>
+            <a:r>
+              <a:rPr lang="it-IT" b="1" dirty="0"/>
+              <a:t>schedule builds to </a:t>
+            </a:r>
+            <a:r>
+              <a:rPr lang="it-IT" b="1" dirty="0" err="1"/>
+              <a:t>dedicated</a:t>
+            </a:r>
+            <a:r>
+              <a:rPr lang="it-IT" b="1" dirty="0"/>
+              <a:t> </a:t>
+            </a:r>
+            <a:r>
+              <a:rPr lang="it-IT" b="1" dirty="0" err="1"/>
+              <a:t>nodes</a:t>
+            </a:r>
+            <a:r>
+              <a:rPr lang="it-IT" b="1" dirty="0"/>
+              <a:t> </a:t>
+            </a:r>
+            <a:r>
+              <a:rPr lang="it-IT" dirty="0"/>
+              <a:t>(</a:t>
+            </a:r>
+            <a:r>
               <a:rPr lang="it-IT" dirty="0" err="1"/>
-              <a:t>Additionally</a:t>
+              <a:t>called</a:t>
             </a:r>
             <a:r>
               <a:rPr lang="it-IT" dirty="0"/>
-              <a:t> </a:t>
-            </a:r>
-            <a:r>
-              <a:rPr lang="it-IT" dirty="0" err="1"/>
-              <a:t>it</a:t>
-            </a:r>
-            <a:r>
-              <a:rPr lang="it-IT" dirty="0"/>
-              <a:t> </a:t>
-            </a:r>
-            <a:r>
-              <a:rPr lang="it-IT" dirty="0" err="1"/>
-              <a:t>already</a:t>
-            </a:r>
-            <a:r>
-              <a:rPr lang="it-IT" dirty="0"/>
-              <a:t> </a:t>
-            </a:r>
-            <a:r>
-              <a:rPr lang="it-IT" dirty="0" err="1"/>
-              <a:t>implements</a:t>
-            </a:r>
-            <a:r>
-              <a:rPr lang="it-IT" dirty="0"/>
-              <a:t> an </a:t>
-            </a:r>
-            <a:r>
-              <a:rPr lang="it-IT" dirty="0" err="1"/>
-              <a:t>internal</a:t>
-            </a:r>
-            <a:r>
-              <a:rPr lang="it-IT" dirty="0"/>
-              <a:t> </a:t>
-            </a:r>
-            <a:r>
-              <a:rPr lang="it-IT" dirty="0" err="1"/>
-              <a:t>queue</a:t>
-            </a:r>
-            <a:r>
-              <a:rPr lang="it-IT" dirty="0"/>
-              <a:t> (</a:t>
-            </a:r>
-            <a:r>
-              <a:rPr lang="it-IT" dirty="0" err="1"/>
-              <a:t>async</a:t>
-            </a:r>
-            <a:r>
-              <a:rPr lang="it-IT" dirty="0"/>
-              <a:t> interaction) and can schedule builds to </a:t>
-            </a:r>
-            <a:r>
-              <a:rPr lang="it-IT" dirty="0" err="1"/>
-              <a:t>dedicated</a:t>
-            </a:r>
-            <a:r>
-              <a:rPr lang="it-IT" dirty="0"/>
-              <a:t> </a:t>
-            </a:r>
-            <a:r>
-              <a:rPr lang="it-IT" dirty="0" err="1"/>
-              <a:t>nodes</a:t>
-            </a:r>
-            <a:r>
-              <a:rPr lang="it-IT" dirty="0"/>
-              <a:t> (agents) </a:t>
+              <a:t> agents) </a:t>
             </a:r>
             <a:r>
               <a:rPr lang="it-IT" dirty="0" err="1"/>
@@ -7549,7 +7613,7 @@
             </a:r>
             <a:r>
               <a:rPr lang="it-IT" dirty="0"/>
-              <a:t> to scale.</a:t>
+              <a:t> to scale up the system on demand.</a:t>
             </a:r>
           </a:p>
           <a:p>
@@ -7791,8 +7855,42 @@
           <a:lstStyle/>
           <a:p>
             <a:r>
+              <a:rPr lang="it-IT" b="1" dirty="0" err="1"/>
+              <a:t>Considering</a:t>
+            </a:r>
+            <a:r>
+              <a:rPr lang="it-IT" b="1" dirty="0"/>
+              <a:t> </a:t>
+            </a:r>
+            <a:r>
+              <a:rPr lang="it-IT" b="1" dirty="0" err="1"/>
+              <a:t>now</a:t>
+            </a:r>
+            <a:r>
+              <a:rPr lang="it-IT" b="1" dirty="0"/>
+              <a:t> the </a:t>
+            </a:r>
+            <a:r>
+              <a:rPr lang="it-IT" b="1" dirty="0" err="1"/>
+              <a:t>static</a:t>
+            </a:r>
+            <a:r>
+              <a:rPr lang="it-IT" b="1" dirty="0"/>
+              <a:t> </a:t>
+            </a:r>
+            <a:r>
+              <a:rPr lang="it-IT" b="1" dirty="0" err="1"/>
+              <a:t>analysis</a:t>
+            </a:r>
+            <a:r>
+              <a:rPr lang="it-IT" b="1" dirty="0"/>
+              <a:t> service</a:t>
+            </a:r>
+          </a:p>
+          <a:p>
+            <a:r>
               <a:rPr lang="it-IT" dirty="0" err="1"/>
-              <a:t>As</a:t>
+              <a:t>This</a:t>
             </a:r>
             <a:r>
               <a:rPr lang="it-IT" dirty="0"/>
@@ -7800,7 +7898,7 @@
             </a:r>
             <a:r>
               <a:rPr lang="it-IT" dirty="0" err="1"/>
-              <a:t>we</a:t>
+              <a:t>is</a:t>
             </a:r>
             <a:r>
               <a:rPr lang="it-IT" dirty="0"/>
@@ -7808,7 +7906,87 @@
             </a:r>
             <a:r>
               <a:rPr lang="it-IT" dirty="0" err="1"/>
-              <a:t>said</a:t>
+              <a:t>also</a:t>
+            </a:r>
+            <a:r>
+              <a:rPr lang="it-IT" dirty="0"/>
+              <a:t> a CPU intensive task </a:t>
+            </a:r>
+            <a:r>
+              <a:rPr lang="it-IT" b="1" dirty="0"/>
+              <a:t>and </a:t>
+            </a:r>
+            <a:r>
+              <a:rPr lang="it-IT" b="1" dirty="0" err="1"/>
+              <a:t>thus</a:t>
+            </a:r>
+            <a:r>
+              <a:rPr lang="it-IT" b="1" dirty="0"/>
+              <a:t> </a:t>
+            </a:r>
+            <a:r>
+              <a:rPr lang="it-IT" b="1" dirty="0" err="1"/>
+              <a:t>we</a:t>
+            </a:r>
+            <a:r>
+              <a:rPr lang="it-IT" b="1" dirty="0"/>
+              <a:t> </a:t>
+            </a:r>
+            <a:r>
+              <a:rPr lang="it-IT" b="1" dirty="0" err="1"/>
+              <a:t>decided</a:t>
+            </a:r>
+            <a:r>
+              <a:rPr lang="it-IT" b="1" dirty="0"/>
+              <a:t> to </a:t>
+            </a:r>
+            <a:r>
+              <a:rPr lang="it-IT" b="1" dirty="0" err="1"/>
+              <a:t>implement</a:t>
+            </a:r>
+            <a:r>
+              <a:rPr lang="it-IT" b="1" dirty="0"/>
+              <a:t> </a:t>
+            </a:r>
+            <a:r>
+              <a:rPr lang="it-IT" b="1" dirty="0" err="1"/>
+              <a:t>this</a:t>
+            </a:r>
+            <a:r>
+              <a:rPr lang="it-IT" b="1" dirty="0"/>
+              <a:t> feature with an </a:t>
+            </a:r>
+            <a:r>
+              <a:rPr lang="it-IT" b="1" dirty="0" err="1"/>
+              <a:t>already</a:t>
+            </a:r>
+            <a:r>
+              <a:rPr lang="it-IT" b="1" dirty="0"/>
+              <a:t> </a:t>
+            </a:r>
+            <a:r>
+              <a:rPr lang="it-IT" b="1" dirty="0" err="1"/>
+              <a:t>existing</a:t>
+            </a:r>
+            <a:r>
+              <a:rPr lang="it-IT" b="1" dirty="0"/>
+              <a:t> </a:t>
+            </a:r>
+            <a:r>
+              <a:rPr lang="it-IT" b="1" dirty="0" err="1"/>
+              <a:t>external</a:t>
+            </a:r>
+            <a:r>
+              <a:rPr lang="it-IT" b="1" dirty="0"/>
+              <a:t> </a:t>
+            </a:r>
+            <a:r>
+              <a:rPr lang="it-IT" dirty="0"/>
+              <a:t>service </a:t>
+            </a:r>
+            <a:r>
+              <a:rPr lang="it-IT" dirty="0" err="1"/>
+              <a:t>called</a:t>
             </a:r>
             <a:r>
               <a:rPr lang="it-IT" dirty="0"/>
@@ -7816,145 +7994,75 @@
             </a:r>
             <a:r>
               <a:rPr lang="it-IT" dirty="0" err="1"/>
-              <a:t>before</a:t>
-            </a:r>
-            <a:r>
-              <a:rPr lang="it-IT" dirty="0"/>
-              <a:t> </a:t>
-            </a:r>
-            <a:r>
-              <a:rPr lang="it-IT" dirty="0" err="1"/>
-              <a:t>this</a:t>
-            </a:r>
-            <a:r>
-              <a:rPr lang="it-IT" dirty="0"/>
-              <a:t> </a:t>
-            </a:r>
-            <a:r>
-              <a:rPr lang="it-IT" dirty="0" err="1"/>
-              <a:t>is</a:t>
-            </a:r>
-            <a:r>
-              <a:rPr lang="it-IT" dirty="0"/>
-              <a:t> </a:t>
-            </a:r>
-            <a:r>
-              <a:rPr lang="it-IT" dirty="0" err="1"/>
-              <a:t>also</a:t>
-            </a:r>
-            <a:r>
-              <a:rPr lang="it-IT" dirty="0"/>
-              <a:t> a CPU intensive task so </a:t>
-            </a:r>
-            <a:r>
-              <a:rPr lang="it-IT" dirty="0" err="1"/>
-              <a:t>we</a:t>
-            </a:r>
-            <a:r>
-              <a:rPr lang="it-IT" dirty="0"/>
-              <a:t> </a:t>
-            </a:r>
-            <a:r>
-              <a:rPr lang="it-IT" dirty="0" err="1"/>
-              <a:t>also</a:t>
-            </a:r>
-            <a:r>
-              <a:rPr lang="it-IT" dirty="0"/>
-              <a:t> </a:t>
-            </a:r>
-            <a:r>
-              <a:rPr lang="it-IT" dirty="0" err="1"/>
-              <a:t>used</a:t>
-            </a:r>
-            <a:r>
-              <a:rPr lang="it-IT" dirty="0"/>
-              <a:t> an </a:t>
-            </a:r>
-            <a:r>
-              <a:rPr lang="it-IT" dirty="0" err="1"/>
-              <a:t>external</a:t>
-            </a:r>
-            <a:r>
-              <a:rPr lang="it-IT" dirty="0"/>
-              <a:t> service </a:t>
-            </a:r>
-            <a:r>
-              <a:rPr lang="it-IT" dirty="0" err="1"/>
-              <a:t>called</a:t>
-            </a:r>
-            <a:r>
-              <a:rPr lang="it-IT" dirty="0"/>
-              <a:t> </a:t>
-            </a:r>
-            <a:r>
-              <a:rPr lang="it-IT" dirty="0" err="1"/>
               <a:t>sonarCloud</a:t>
             </a:r>
             <a:r>
               <a:rPr lang="it-IT" dirty="0"/>
               <a:t>.</a:t>
             </a:r>
+          </a:p>
+          <a:p>
             <a:br>
               <a:rPr lang="it-IT" dirty="0"/>
             </a:br>
             <a:r>
-              <a:rPr lang="it-IT" dirty="0" err="1"/>
+              <a:rPr lang="it-IT" b="1" dirty="0" err="1"/>
               <a:t>It</a:t>
             </a:r>
             <a:r>
-              <a:rPr lang="it-IT" dirty="0"/>
+              <a:rPr lang="it-IT" b="1" dirty="0"/>
               <a:t> </a:t>
             </a:r>
             <a:r>
-              <a:rPr lang="it-IT" dirty="0" err="1"/>
+              <a:rPr lang="it-IT" b="1" dirty="0" err="1"/>
               <a:t>would</a:t>
             </a:r>
             <a:r>
-              <a:rPr lang="it-IT" dirty="0"/>
+              <a:rPr lang="it-IT" b="1" dirty="0"/>
               <a:t> </a:t>
             </a:r>
             <a:r>
-              <a:rPr lang="it-IT" dirty="0" err="1"/>
+              <a:rPr lang="it-IT" b="1" dirty="0" err="1"/>
               <a:t>have</a:t>
             </a:r>
             <a:r>
-              <a:rPr lang="it-IT" dirty="0"/>
+              <a:rPr lang="it-IT" b="1" dirty="0"/>
               <a:t> </a:t>
             </a:r>
             <a:r>
-              <a:rPr lang="it-IT" dirty="0" err="1"/>
+              <a:rPr lang="it-IT" b="1" dirty="0" err="1"/>
               <a:t>been</a:t>
             </a:r>
             <a:r>
-              <a:rPr lang="it-IT" dirty="0"/>
+              <a:rPr lang="it-IT" b="1" dirty="0"/>
               <a:t> </a:t>
             </a:r>
             <a:r>
-              <a:rPr lang="it-IT" dirty="0" err="1"/>
+              <a:rPr lang="it-IT" b="1" dirty="0" err="1"/>
               <a:t>not</a:t>
             </a:r>
             <a:r>
-              <a:rPr lang="it-IT" dirty="0"/>
+              <a:rPr lang="it-IT" b="1" dirty="0"/>
               <a:t> </a:t>
             </a:r>
             <a:r>
-              <a:rPr lang="it-IT" dirty="0" err="1"/>
+              <a:rPr lang="it-IT" b="1" dirty="0" err="1"/>
               <a:t>trivial</a:t>
             </a:r>
             <a:r>
-              <a:rPr lang="it-IT" dirty="0"/>
+              <a:rPr lang="it-IT" b="1" dirty="0"/>
               <a:t> </a:t>
             </a:r>
             <a:r>
-              <a:rPr lang="it-IT" dirty="0" err="1"/>
+              <a:rPr lang="it-IT" b="1" dirty="0" err="1"/>
               <a:t>reimplement</a:t>
             </a:r>
             <a:r>
-              <a:rPr lang="it-IT" dirty="0"/>
+              <a:rPr lang="it-IT" b="1" dirty="0"/>
               <a:t> </a:t>
             </a:r>
             <a:r>
-              <a:rPr lang="it-IT" dirty="0" err="1"/>
+              <a:rPr lang="it-IT" b="1" dirty="0" err="1"/>
               <a:t>all</a:t>
             </a:r>
             <a:r>
@@ -8048,49 +8156,141 @@
               <a:rPr lang="it-IT" dirty="0"/>
             </a:br>
             <a:r>
+              <a:rPr lang="it-IT" dirty="0" err="1"/>
+              <a:t>Each</a:t>
+            </a:r>
+            <a:r>
               <a:rPr lang="it-IT" dirty="0"/>
-              <a:t>(</a:t>
+              <a:t> </a:t>
             </a:r>
             <a:r>
               <a:rPr lang="it-IT" dirty="0" err="1"/>
-              <a:t>sonarQube</a:t>
+              <a:t>battle</a:t>
             </a:r>
             <a:r>
               <a:rPr lang="it-IT" dirty="0"/>
-              <a:t> è in locale ma costa di </a:t>
+              <a:t> </a:t>
             </a:r>
             <a:r>
               <a:rPr lang="it-IT" dirty="0" err="1"/>
-              <a:t>piú</a:t>
+              <a:t>contains</a:t>
             </a:r>
             <a:r>
               <a:rPr lang="it-IT" dirty="0"/>
-              <a:t> e inoltre solo la versione datacenter è scalabile (gli altri no cluster di worker),</a:t>
-            </a:r>
-          </a:p>
-          <a:p>
+              <a:t> a </a:t>
+            </a:r>
+            <a:r>
+              <a:rPr lang="it-IT" dirty="0" err="1"/>
+              <a:t>sonarRules</a:t>
+            </a:r>
+            <a:r>
+              <a:rPr lang="it-IT" dirty="0"/>
+              <a:t> field </a:t>
+            </a:r>
+            <a:r>
+              <a:rPr lang="it-IT" dirty="0" err="1"/>
+              <a:t>that</a:t>
+            </a:r>
+            <a:r>
+              <a:rPr lang="it-IT" dirty="0"/>
+              <a:t> </a:t>
+            </a:r>
             <a:r>
               <a:rPr lang="it-IT" dirty="0" err="1"/>
               <a:t>sonarCloud</a:t>
             </a:r>
             <a:r>
               <a:rPr lang="it-IT" dirty="0"/>
+              <a:t> must </a:t>
+            </a:r>
+            <a:r>
+              <a:rPr lang="it-IT" dirty="0" err="1"/>
+              <a:t>consider</a:t>
+            </a:r>
+            <a:r>
+              <a:rPr lang="it-IT" dirty="0"/>
+              <a:t> in </a:t>
+            </a:r>
+            <a:r>
+              <a:rPr lang="it-IT" dirty="0" err="1"/>
+              <a:t>order</a:t>
+            </a:r>
+            <a:r>
+              <a:rPr lang="it-IT" dirty="0"/>
+              <a:t> to </a:t>
+            </a:r>
+            <a:r>
+              <a:rPr lang="it-IT" dirty="0" err="1"/>
+              <a:t>analyse</a:t>
+            </a:r>
+            <a:r>
+              <a:rPr lang="it-IT" dirty="0"/>
+              <a:t> the source code </a:t>
+            </a:r>
+            <a:r>
+              <a:rPr lang="it-IT" dirty="0" err="1"/>
+              <a:t>correctly</a:t>
+            </a:r>
+            <a:r>
+              <a:rPr lang="it-IT" dirty="0"/>
+              <a:t>.</a:t>
+            </a:r>
+          </a:p>
+          <a:p>
+            <a:endParaRPr lang="it-IT" dirty="0"/>
+          </a:p>
+          <a:p>
+            <a:r>
+              <a:rPr lang="it-IT" dirty="0"/>
+              <a:t>-------</a:t>
+            </a:r>
+            <a:br>
+              <a:rPr lang="it-IT" dirty="0"/>
+            </a:br>
+            <a:r>
+              <a:rPr lang="it-IT" b="0" i="1" dirty="0"/>
+              <a:t>(</a:t>
+            </a:r>
+            <a:r>
+              <a:rPr lang="it-IT" b="0" i="1" dirty="0" err="1"/>
+              <a:t>sonarQube</a:t>
+            </a:r>
+            <a:r>
+              <a:rPr lang="it-IT" b="0" i="1" dirty="0"/>
+              <a:t> è in locale ma costa di </a:t>
+            </a:r>
+            <a:r>
+              <a:rPr lang="it-IT" b="0" i="1" dirty="0" err="1"/>
+              <a:t>piú</a:t>
+            </a:r>
+            <a:r>
+              <a:rPr lang="it-IT" b="0" i="1" dirty="0"/>
+              <a:t> e inoltre solo la versione datacenter è scalabile (gli altri no cluster di worker),</a:t>
+            </a:r>
+          </a:p>
+          <a:p>
+            <a:r>
+              <a:rPr lang="it-IT" b="0" i="1" dirty="0" err="1"/>
+              <a:t>sonarCloud</a:t>
+            </a:r>
+            <a:r>
+              <a:rPr lang="it-IT" b="0" i="1" dirty="0"/>
               <a:t> costa 100k righe di codice 11 </a:t>
             </a:r>
             <a:r>
-              <a:rPr lang="it-IT" dirty="0" err="1"/>
+              <a:rPr lang="it-IT" b="0" i="1" dirty="0" err="1"/>
               <a:t>eu</a:t>
             </a:r>
             <a:r>
-              <a:rPr lang="it-IT" dirty="0"/>
+              <a:rPr lang="it-IT" b="0" i="1" dirty="0"/>
               <a:t>/mese, 250k 80eu/mese, .. Fino a 20mln righe al mese 5’250 </a:t>
             </a:r>
             <a:r>
-              <a:rPr lang="it-IT" dirty="0" err="1"/>
+              <a:rPr lang="it-IT" b="0" i="1" dirty="0" err="1"/>
               <a:t>eu</a:t>
             </a:r>
             <a:r>
-              <a:rPr lang="it-IT" dirty="0"/>
+              <a:rPr lang="it-IT" b="0" i="1" dirty="0"/>
               <a:t>/mese,</a:t>
             </a:r>
           </a:p>
@@ -8113,7 +8313,7 @@
               <a:defRPr/>
             </a:pPr>
             <a:r>
-              <a:rPr lang="en-US" b="1" i="0" dirty="0">
+              <a:rPr lang="en-US" b="0" i="1" dirty="0">
                 <a:solidFill>
                   <a:srgbClr val="000000"/>
                 </a:solidFill>
@@ -8123,7 +8323,7 @@
               <a:t>Public projects (open source) analysis is always free</a:t>
             </a:r>
             <a:r>
-              <a:rPr lang="it-IT" b="0" i="0" dirty="0">
+              <a:rPr lang="it-IT" b="0" i="1" dirty="0">
                 <a:solidFill>
                   <a:srgbClr val="000000"/>
                 </a:solidFill>
@@ -8131,6 +8331,29 @@
                 <a:latin typeface="Maven Pro"/>
               </a:rPr>
               <a:t>)</a:t>
+            </a:r>
+          </a:p>
+          <a:p>
+            <a:pPr marL="0" marR="0" lvl="0" indent="0" algn="l" defTabSz="914400" rtl="0" eaLnBrk="1" fontAlgn="auto" latinLnBrk="0" hangingPunct="1">
+              <a:lnSpc>
+                <a:spcPct val="100000"/>
+              </a:lnSpc>
+              <a:spcBef>
+                <a:spcPts val="0"/>
+              </a:spcBef>
+              <a:spcAft>
+                <a:spcPts val="0"/>
+              </a:spcAft>
+              <a:buClrTx/>
+              <a:buSzTx/>
+              <a:buFontTx/>
+              <a:buNone/>
+              <a:tabLst/>
+              <a:defRPr/>
+            </a:pPr>
+            <a:r>
+              <a:rPr lang="it-IT" dirty="0"/>
+              <a:t>-------</a:t>
             </a:r>
           </a:p>
           <a:p>
@@ -8307,55 +8530,55 @@
               <a:t> service </a:t>
             </a:r>
             <a:r>
-              <a:rPr lang="it-IT" dirty="0" err="1"/>
+              <a:rPr lang="it-IT" b="1" dirty="0" err="1"/>
               <a:t>we</a:t>
             </a:r>
             <a:r>
-              <a:rPr lang="it-IT" dirty="0"/>
+              <a:rPr lang="it-IT" b="1" dirty="0"/>
               <a:t> </a:t>
             </a:r>
             <a:r>
-              <a:rPr lang="it-IT" dirty="0" err="1"/>
+              <a:rPr lang="it-IT" b="1" dirty="0" err="1"/>
               <a:t>decided</a:t>
             </a:r>
             <a:r>
-              <a:rPr lang="it-IT" dirty="0"/>
+              <a:rPr lang="it-IT" b="1" dirty="0"/>
               <a:t> to </a:t>
             </a:r>
             <a:r>
-              <a:rPr lang="it-IT" dirty="0" err="1"/>
+              <a:rPr lang="it-IT" b="1" dirty="0" err="1"/>
               <a:t>implement</a:t>
             </a:r>
             <a:r>
-              <a:rPr lang="it-IT" dirty="0"/>
+              <a:rPr lang="it-IT" b="1" dirty="0"/>
               <a:t> </a:t>
             </a:r>
             <a:r>
-              <a:rPr lang="it-IT" dirty="0" err="1"/>
+              <a:rPr lang="it-IT" b="1" dirty="0" err="1"/>
               <a:t>it</a:t>
             </a:r>
             <a:r>
-              <a:rPr lang="it-IT" dirty="0"/>
+              <a:rPr lang="it-IT" b="1" dirty="0"/>
               <a:t> </a:t>
             </a:r>
             <a:r>
-              <a:rPr lang="it-IT" dirty="0" err="1"/>
+              <a:rPr lang="it-IT" b="1" dirty="0" err="1"/>
               <a:t>asynchrously</a:t>
             </a:r>
             <a:r>
-              <a:rPr lang="it-IT" dirty="0"/>
+              <a:rPr lang="it-IT" b="1" dirty="0"/>
               <a:t> </a:t>
             </a:r>
             <a:r>
-              <a:rPr lang="it-IT" dirty="0" err="1"/>
+              <a:rPr lang="it-IT" b="1" dirty="0" err="1"/>
               <a:t>using</a:t>
             </a:r>
             <a:r>
-              <a:rPr lang="it-IT" dirty="0"/>
+              <a:rPr lang="it-IT" b="1" dirty="0"/>
               <a:t> a pub-sub style pattern with </a:t>
             </a:r>
             <a:r>
-              <a:rPr lang="it-IT" dirty="0" err="1"/>
+              <a:rPr lang="it-IT" b="1" dirty="0" err="1"/>
               <a:t>RabbitMQ</a:t>
             </a:r>
             <a:r>
@@ -8387,7 +8610,14 @@
             </a:pPr>
             <a:r>
               <a:rPr lang="en-US" sz="1200" b="1" dirty="0"/>
-              <a:t>Queue used by the Platform Service to push messages asynchronously</a:t>
+              <a:t>How we do it?</a:t>
+            </a:r>
+            <a:br>
+              <a:rPr lang="en-US" sz="1200" b="1" dirty="0"/>
+            </a:br>
+            <a:r>
+              <a:rPr lang="en-US" sz="1200" b="1" dirty="0"/>
+              <a:t>The Platform Service uses the queue to push messages asynchronously</a:t>
             </a:r>
             <a:br>
               <a:rPr lang="en-US" sz="1200" b="1" dirty="0"/>
@@ -9598,19 +9828,27 @@
           <a:p>
             <a:r>
               <a:rPr lang="it-IT" dirty="0"/>
-              <a:t>No more </a:t>
+              <a:t>A </a:t>
             </a:r>
             <a:r>
               <a:rPr lang="it-IT" dirty="0" err="1"/>
-              <a:t>animations</a:t>
+              <a:t>meaningful</a:t>
             </a:r>
             <a:r>
               <a:rPr lang="it-IT" dirty="0"/>
-              <a:t> after </a:t>
+              <a:t> use case </a:t>
             </a:r>
             <a:r>
               <a:rPr lang="it-IT" dirty="0" err="1"/>
-              <a:t>purple</a:t>
+              <a:t>is</a:t>
+            </a:r>
+            <a:r>
+              <a:rPr lang="it-IT" dirty="0"/>
+              <a:t> the UC7: «</a:t>
+            </a:r>
+            <a:r>
+              <a:rPr lang="it-IT" dirty="0" err="1"/>
+              <a:t>Student</a:t>
             </a:r>
             <a:r>
               <a:rPr lang="it-IT" dirty="0"/>
@@ -9618,11 +9856,515 @@
             </a:r>
             <a:r>
               <a:rPr lang="it-IT" dirty="0" err="1"/>
-              <a:t>animation</a:t>
-            </a:r>
-            <a:endParaRPr lang="it-IT" dirty="0"/>
-          </a:p>
-          <a:p>
+              <a:t>pushes</a:t>
+            </a:r>
+            <a:r>
+              <a:rPr lang="it-IT" dirty="0"/>
+              <a:t> and triggers </a:t>
+            </a:r>
+            <a:r>
+              <a:rPr lang="it-IT" dirty="0" err="1"/>
+              <a:t>automatic</a:t>
+            </a:r>
+            <a:r>
+              <a:rPr lang="it-IT" dirty="0"/>
+              <a:t> </a:t>
+            </a:r>
+            <a:r>
+              <a:rPr lang="it-IT" dirty="0" err="1"/>
+              <a:t>evaluation</a:t>
+            </a:r>
+            <a:r>
+              <a:rPr lang="it-IT" dirty="0"/>
+              <a:t>»</a:t>
+            </a:r>
+            <a:br>
+              <a:rPr lang="it-IT" dirty="0"/>
+            </a:br>
+            <a:r>
+              <a:rPr lang="it-IT" dirty="0" err="1"/>
+              <a:t>We</a:t>
+            </a:r>
+            <a:r>
+              <a:rPr lang="it-IT" dirty="0"/>
+              <a:t> </a:t>
+            </a:r>
+            <a:r>
+              <a:rPr lang="it-IT" dirty="0" err="1"/>
+              <a:t>decided</a:t>
+            </a:r>
+            <a:r>
+              <a:rPr lang="it-IT" dirty="0"/>
+              <a:t> to </a:t>
+            </a:r>
+            <a:r>
+              <a:rPr lang="it-IT" dirty="0" err="1"/>
+              <a:t>present</a:t>
+            </a:r>
+            <a:r>
+              <a:rPr lang="it-IT" dirty="0"/>
+              <a:t> </a:t>
+            </a:r>
+            <a:r>
+              <a:rPr lang="it-IT" dirty="0" err="1"/>
+              <a:t>this</a:t>
+            </a:r>
+            <a:r>
+              <a:rPr lang="it-IT" dirty="0"/>
+              <a:t> use case </a:t>
+            </a:r>
+            <a:r>
+              <a:rPr lang="it-IT" dirty="0" err="1"/>
+              <a:t>because</a:t>
+            </a:r>
+            <a:r>
+              <a:rPr lang="it-IT" dirty="0"/>
+              <a:t> </a:t>
+            </a:r>
+            <a:r>
+              <a:rPr lang="it-IT" dirty="0" err="1"/>
+              <a:t>it</a:t>
+            </a:r>
+            <a:r>
+              <a:rPr lang="it-IT" dirty="0"/>
+              <a:t> </a:t>
+            </a:r>
+            <a:r>
+              <a:rPr lang="it-IT" dirty="0" err="1"/>
+              <a:t>includes</a:t>
+            </a:r>
+            <a:r>
+              <a:rPr lang="it-IT" dirty="0"/>
+              <a:t> some of the </a:t>
+            </a:r>
+            <a:r>
+              <a:rPr lang="it-IT" dirty="0" err="1"/>
+              <a:t>most</a:t>
+            </a:r>
+            <a:r>
+              <a:rPr lang="it-IT" dirty="0"/>
+              <a:t> </a:t>
+            </a:r>
+            <a:r>
+              <a:rPr lang="it-IT" dirty="0" err="1"/>
+              <a:t>important</a:t>
+            </a:r>
+            <a:r>
+              <a:rPr lang="it-IT" dirty="0"/>
+              <a:t> </a:t>
+            </a:r>
+            <a:r>
+              <a:rPr lang="it-IT" dirty="0" err="1"/>
+              <a:t>actors</a:t>
+            </a:r>
+            <a:r>
+              <a:rPr lang="it-IT" dirty="0"/>
+              <a:t> like «the system», «the </a:t>
+            </a:r>
+            <a:r>
+              <a:rPr lang="it-IT" dirty="0" err="1"/>
+              <a:t>static</a:t>
+            </a:r>
+            <a:r>
+              <a:rPr lang="it-IT" dirty="0"/>
+              <a:t> </a:t>
+            </a:r>
+            <a:r>
+              <a:rPr lang="it-IT" dirty="0" err="1"/>
+              <a:t>analysis</a:t>
+            </a:r>
+            <a:r>
+              <a:rPr lang="it-IT" dirty="0"/>
+              <a:t> tool», «the </a:t>
+            </a:r>
+            <a:r>
+              <a:rPr lang="it-IT" dirty="0" err="1"/>
+              <a:t>github</a:t>
+            </a:r>
+            <a:r>
+              <a:rPr lang="it-IT" dirty="0"/>
+              <a:t> </a:t>
+            </a:r>
+            <a:r>
+              <a:rPr lang="it-IT" dirty="0" err="1"/>
+              <a:t>platform</a:t>
+            </a:r>
+            <a:r>
+              <a:rPr lang="it-IT" dirty="0"/>
+              <a:t>» and «the </a:t>
+            </a:r>
+            <a:r>
+              <a:rPr lang="it-IT" dirty="0" err="1"/>
+              <a:t>students</a:t>
+            </a:r>
+            <a:r>
+              <a:rPr lang="it-IT" dirty="0"/>
+              <a:t> in the team».</a:t>
+            </a:r>
+          </a:p>
+          <a:p>
+            <a:pPr marL="228600" indent="-228600">
+              <a:buFont typeface="+mj-lt"/>
+              <a:buAutoNum type="arabicPeriod"/>
+            </a:pPr>
+            <a:r>
+              <a:rPr lang="it-IT" dirty="0"/>
+              <a:t>The event flow starts with the </a:t>
+            </a:r>
+            <a:r>
+              <a:rPr lang="it-IT" dirty="0" err="1"/>
+              <a:t>student</a:t>
+            </a:r>
+            <a:r>
+              <a:rPr lang="it-IT" dirty="0"/>
+              <a:t> </a:t>
+            </a:r>
+            <a:r>
+              <a:rPr lang="it-IT" dirty="0" err="1"/>
+              <a:t>committing</a:t>
+            </a:r>
+            <a:r>
+              <a:rPr lang="it-IT" dirty="0"/>
+              <a:t> and </a:t>
+            </a:r>
+            <a:r>
+              <a:rPr lang="it-IT" dirty="0" err="1"/>
+              <a:t>pushing</a:t>
+            </a:r>
+            <a:r>
+              <a:rPr lang="it-IT" dirty="0"/>
+              <a:t> the new source code to the </a:t>
+            </a:r>
+            <a:r>
+              <a:rPr lang="it-IT" dirty="0" err="1"/>
+              <a:t>github</a:t>
+            </a:r>
+            <a:r>
+              <a:rPr lang="it-IT" dirty="0"/>
+              <a:t> repo.</a:t>
+            </a:r>
+          </a:p>
+          <a:p>
+            <a:pPr marL="228600" indent="-228600">
+              <a:buFont typeface="+mj-lt"/>
+              <a:buAutoNum type="arabicPeriod"/>
+            </a:pPr>
+            <a:r>
+              <a:rPr lang="it-IT" dirty="0" err="1"/>
+              <a:t>Then</a:t>
+            </a:r>
+            <a:r>
+              <a:rPr lang="it-IT" dirty="0"/>
+              <a:t>, the GitHub Action </a:t>
+            </a:r>
+            <a:r>
+              <a:rPr lang="it-IT" dirty="0" err="1"/>
+              <a:t>platform</a:t>
+            </a:r>
+            <a:r>
+              <a:rPr lang="it-IT" dirty="0"/>
+              <a:t> </a:t>
+            </a:r>
+            <a:r>
+              <a:rPr lang="it-IT" dirty="0" err="1"/>
+              <a:t>notifies</a:t>
+            </a:r>
+            <a:r>
+              <a:rPr lang="it-IT" dirty="0"/>
+              <a:t> the system </a:t>
+            </a:r>
+            <a:r>
+              <a:rPr lang="it-IT" dirty="0" err="1"/>
+              <a:t>about</a:t>
+            </a:r>
+            <a:r>
+              <a:rPr lang="it-IT" dirty="0"/>
+              <a:t> the </a:t>
+            </a:r>
+            <a:r>
+              <a:rPr lang="it-IT" dirty="0" err="1"/>
+              <a:t>the</a:t>
+            </a:r>
+            <a:r>
+              <a:rPr lang="it-IT" dirty="0"/>
+              <a:t> </a:t>
+            </a:r>
+            <a:r>
+              <a:rPr lang="it-IT" dirty="0" err="1"/>
+              <a:t>push</a:t>
+            </a:r>
+            <a:r>
+              <a:rPr lang="it-IT" dirty="0"/>
+              <a:t>.</a:t>
+            </a:r>
+          </a:p>
+          <a:p>
+            <a:pPr marL="228600" indent="-228600">
+              <a:buFont typeface="+mj-lt"/>
+              <a:buAutoNum type="arabicPeriod"/>
+            </a:pPr>
+            <a:r>
+              <a:rPr lang="it-IT" dirty="0"/>
+              <a:t>The system can </a:t>
+            </a:r>
+            <a:r>
+              <a:rPr lang="it-IT" dirty="0" err="1"/>
+              <a:t>now</a:t>
+            </a:r>
+            <a:r>
+              <a:rPr lang="it-IT" dirty="0"/>
+              <a:t> pull the new </a:t>
+            </a:r>
+            <a:r>
+              <a:rPr lang="it-IT" dirty="0" err="1"/>
+              <a:t>updated</a:t>
+            </a:r>
+            <a:r>
+              <a:rPr lang="it-IT" dirty="0"/>
+              <a:t> source code and start </a:t>
+            </a:r>
+            <a:r>
+              <a:rPr lang="it-IT" dirty="0" err="1"/>
+              <a:t>analyzing</a:t>
+            </a:r>
+            <a:r>
+              <a:rPr lang="it-IT" dirty="0"/>
+              <a:t> </a:t>
+            </a:r>
+            <a:r>
+              <a:rPr lang="it-IT" dirty="0" err="1"/>
+              <a:t>it</a:t>
+            </a:r>
+            <a:r>
+              <a:rPr lang="it-IT" dirty="0"/>
+              <a:t>.</a:t>
+            </a:r>
+          </a:p>
+          <a:p>
+            <a:pPr marL="228600" indent="-228600">
+              <a:buFont typeface="+mj-lt"/>
+              <a:buAutoNum type="arabicPeriod"/>
+            </a:pPr>
+            <a:r>
+              <a:rPr lang="it-IT" dirty="0"/>
+              <a:t>The first </a:t>
+            </a:r>
+            <a:r>
+              <a:rPr lang="it-IT" dirty="0" err="1"/>
+              <a:t>thing</a:t>
+            </a:r>
+            <a:r>
+              <a:rPr lang="it-IT" dirty="0"/>
+              <a:t> the system </a:t>
+            </a:r>
+            <a:r>
+              <a:rPr lang="it-IT" dirty="0" err="1"/>
+              <a:t>does</a:t>
+            </a:r>
+            <a:r>
+              <a:rPr lang="it-IT" dirty="0"/>
+              <a:t> </a:t>
+            </a:r>
+            <a:r>
+              <a:rPr lang="it-IT" dirty="0" err="1"/>
+              <a:t>is</a:t>
+            </a:r>
+            <a:r>
+              <a:rPr lang="it-IT" dirty="0"/>
+              <a:t> building the project and after </a:t>
+            </a:r>
+            <a:r>
+              <a:rPr lang="it-IT" dirty="0" err="1"/>
+              <a:t>that</a:t>
+            </a:r>
+            <a:r>
+              <a:rPr lang="it-IT" dirty="0"/>
+              <a:t> </a:t>
+            </a:r>
+            <a:r>
+              <a:rPr lang="it-IT" dirty="0" err="1"/>
+              <a:t>it</a:t>
+            </a:r>
+            <a:r>
+              <a:rPr lang="it-IT" dirty="0"/>
+              <a:t> can </a:t>
+            </a:r>
+            <a:r>
+              <a:rPr lang="it-IT" dirty="0" err="1"/>
+              <a:t>perform</a:t>
+            </a:r>
+            <a:r>
+              <a:rPr lang="it-IT" dirty="0"/>
+              <a:t> in </a:t>
+            </a:r>
+            <a:r>
+              <a:rPr lang="it-IT" dirty="0" err="1"/>
+              <a:t>parallel</a:t>
+            </a:r>
+            <a:r>
+              <a:rPr lang="it-IT" dirty="0"/>
+              <a:t> 3 </a:t>
+            </a:r>
+            <a:r>
+              <a:rPr lang="it-IT" dirty="0" err="1"/>
+              <a:t>different</a:t>
+            </a:r>
+            <a:r>
+              <a:rPr lang="it-IT" dirty="0"/>
+              <a:t> </a:t>
+            </a:r>
+            <a:r>
+              <a:rPr lang="it-IT" dirty="0" err="1"/>
+              <a:t>operations</a:t>
+            </a:r>
+            <a:r>
+              <a:rPr lang="it-IT" dirty="0"/>
+              <a:t> in </a:t>
+            </a:r>
+            <a:r>
+              <a:rPr lang="it-IT" dirty="0" err="1"/>
+              <a:t>order</a:t>
+            </a:r>
+            <a:r>
+              <a:rPr lang="it-IT" dirty="0"/>
+              <a:t> to </a:t>
+            </a:r>
+            <a:r>
+              <a:rPr lang="it-IT" dirty="0" err="1"/>
+              <a:t>calculate</a:t>
+            </a:r>
+            <a:r>
+              <a:rPr lang="it-IT" dirty="0"/>
+              <a:t> the score.\</a:t>
+            </a:r>
+          </a:p>
+          <a:p>
+            <a:pPr marL="0" indent="0">
+              <a:buFont typeface="+mj-lt"/>
+              <a:buNone/>
+            </a:pPr>
+            <a:br>
+              <a:rPr lang="it-IT" dirty="0"/>
+            </a:br>
+            <a:r>
+              <a:rPr lang="it-IT" dirty="0"/>
+              <a:t>After </a:t>
+            </a:r>
+            <a:r>
+              <a:rPr lang="it-IT" dirty="0" err="1"/>
+              <a:t>all</a:t>
+            </a:r>
+            <a:r>
+              <a:rPr lang="it-IT" dirty="0"/>
+              <a:t> the </a:t>
+            </a:r>
+            <a:r>
+              <a:rPr lang="it-IT" dirty="0" err="1"/>
+              <a:t>three</a:t>
+            </a:r>
+            <a:r>
+              <a:rPr lang="it-IT" dirty="0"/>
+              <a:t> </a:t>
+            </a:r>
+            <a:r>
+              <a:rPr lang="it-IT" dirty="0" err="1"/>
+              <a:t>different</a:t>
+            </a:r>
+            <a:r>
+              <a:rPr lang="it-IT" dirty="0"/>
+              <a:t> </a:t>
+            </a:r>
+            <a:r>
+              <a:rPr lang="it-IT" dirty="0" err="1"/>
+              <a:t>operations</a:t>
+            </a:r>
+            <a:r>
+              <a:rPr lang="it-IT" dirty="0"/>
+              <a:t> </a:t>
+            </a:r>
+            <a:r>
+              <a:rPr lang="it-IT" dirty="0" err="1"/>
+              <a:t>has</a:t>
+            </a:r>
+            <a:r>
+              <a:rPr lang="it-IT" dirty="0"/>
+              <a:t> </a:t>
+            </a:r>
+            <a:r>
+              <a:rPr lang="it-IT" dirty="0" err="1"/>
+              <a:t>been</a:t>
+            </a:r>
+            <a:r>
+              <a:rPr lang="it-IT" dirty="0"/>
+              <a:t> </a:t>
+            </a:r>
+            <a:r>
+              <a:rPr lang="it-IT" dirty="0" err="1"/>
+              <a:t>completed</a:t>
+            </a:r>
+            <a:r>
+              <a:rPr lang="it-IT" dirty="0"/>
+              <a:t>, the system can </a:t>
+            </a:r>
+            <a:r>
+              <a:rPr lang="it-IT" dirty="0" err="1"/>
+              <a:t>calculate</a:t>
+            </a:r>
+            <a:r>
+              <a:rPr lang="it-IT" dirty="0"/>
+              <a:t> the score and </a:t>
+            </a:r>
+            <a:r>
+              <a:rPr lang="it-IT" dirty="0" err="1"/>
+              <a:t>modify</a:t>
+            </a:r>
+            <a:r>
+              <a:rPr lang="it-IT" dirty="0"/>
+              <a:t> the </a:t>
+            </a:r>
+            <a:r>
+              <a:rPr lang="it-IT" dirty="0" err="1"/>
+              <a:t>battle</a:t>
+            </a:r>
+            <a:r>
+              <a:rPr lang="it-IT" dirty="0"/>
+              <a:t> team score, </a:t>
+            </a:r>
+            <a:r>
+              <a:rPr lang="it-IT" dirty="0" err="1"/>
+              <a:t>notifing</a:t>
+            </a:r>
+            <a:r>
+              <a:rPr lang="it-IT" dirty="0"/>
+              <a:t> </a:t>
+            </a:r>
+            <a:r>
+              <a:rPr lang="it-IT" dirty="0" err="1"/>
+              <a:t>all</a:t>
+            </a:r>
+            <a:r>
+              <a:rPr lang="it-IT" dirty="0"/>
+              <a:t> </a:t>
+            </a:r>
+            <a:r>
+              <a:rPr lang="it-IT" dirty="0" err="1"/>
+              <a:t>students</a:t>
+            </a:r>
+            <a:r>
+              <a:rPr lang="it-IT" dirty="0"/>
+              <a:t> </a:t>
+            </a:r>
+            <a:r>
+              <a:rPr lang="it-IT" dirty="0" err="1"/>
+              <a:t>partecipating</a:t>
+            </a:r>
+            <a:r>
+              <a:rPr lang="it-IT" dirty="0"/>
+              <a:t> in the team.</a:t>
+            </a:r>
+            <a:br>
+              <a:rPr lang="it-IT" dirty="0"/>
+            </a:br>
             <a:endParaRPr lang="it-IT" dirty="0"/>
           </a:p>
           <a:p>
@@ -9741,6 +10483,37 @@
           <a:lstStyle/>
           <a:p>
             <a:r>
+              <a:rPr lang="it-IT" b="1" dirty="0" err="1"/>
+              <a:t>Now</a:t>
+            </a:r>
+            <a:r>
+              <a:rPr lang="it-IT" b="1" dirty="0"/>
+              <a:t> </a:t>
+            </a:r>
+            <a:r>
+              <a:rPr lang="it-IT" b="1" dirty="0" err="1"/>
+              <a:t>let’s</a:t>
+            </a:r>
+            <a:r>
+              <a:rPr lang="it-IT" b="1" dirty="0"/>
+              <a:t> talk </a:t>
+            </a:r>
+            <a:r>
+              <a:rPr lang="it-IT" b="1" dirty="0" err="1"/>
+              <a:t>about</a:t>
+            </a:r>
+            <a:r>
+              <a:rPr lang="it-IT" b="1" dirty="0"/>
+              <a:t> the </a:t>
+            </a:r>
+            <a:r>
+              <a:rPr lang="it-IT" b="1" dirty="0" err="1"/>
+              <a:t>requirements</a:t>
+            </a:r>
+            <a:endParaRPr lang="it-IT" b="1" dirty="0"/>
+          </a:p>
+          <a:p>
+            <a:r>
               <a:rPr lang="it-IT" dirty="0" err="1"/>
               <a:t>Trought</a:t>
             </a:r>
@@ -9813,43 +10586,49 @@
               <a:t> </a:t>
             </a:r>
             <a:r>
-              <a:rPr lang="it-IT" dirty="0" err="1"/>
+              <a:rPr lang="it-IT" b="1" dirty="0" err="1"/>
               <a:t>they</a:t>
             </a:r>
             <a:r>
+              <a:rPr lang="it-IT" b="1" dirty="0"/>
+              <a:t> </a:t>
+            </a:r>
+            <a:r>
+              <a:rPr lang="it-IT" b="1" dirty="0" err="1"/>
+              <a:t>rappresent</a:t>
+            </a:r>
+            <a:r>
+              <a:rPr lang="it-IT" b="1" dirty="0"/>
+              <a:t> the </a:t>
+            </a:r>
+            <a:r>
+              <a:rPr lang="it-IT" b="1" dirty="0" err="1"/>
+              <a:t>basic</a:t>
+            </a:r>
+            <a:r>
+              <a:rPr lang="it-IT" b="1" dirty="0"/>
+              <a:t> </a:t>
+            </a:r>
+            <a:r>
+              <a:rPr lang="it-IT" b="1" dirty="0" err="1"/>
+              <a:t>functionality</a:t>
+            </a:r>
+            <a:r>
+              <a:rPr lang="it-IT" b="1" dirty="0"/>
+              <a:t> of the system</a:t>
+            </a:r>
+            <a:r>
               <a:rPr lang="it-IT" dirty="0"/>
-              <a:t> </a:t>
-            </a:r>
-            <a:r>
-              <a:rPr lang="it-IT" dirty="0" err="1"/>
-              <a:t>rappresent</a:t>
-            </a:r>
-            <a:r>
-              <a:rPr lang="it-IT" dirty="0"/>
-              <a:t> the </a:t>
-            </a:r>
-            <a:r>
-              <a:rPr lang="it-IT" dirty="0" err="1"/>
-              <a:t>basic</a:t>
-            </a:r>
-            <a:r>
-              <a:rPr lang="it-IT" dirty="0"/>
-              <a:t> </a:t>
-            </a:r>
-            <a:r>
-              <a:rPr lang="it-IT" dirty="0" err="1"/>
-              <a:t>functionality</a:t>
-            </a:r>
-            <a:r>
-              <a:rPr lang="it-IT" dirty="0"/>
-              <a:t> of the system.</a:t>
-            </a:r>
+              <a:t>.</a:t>
+            </a:r>
+          </a:p>
+          <a:p>
             <a:br>
               <a:rPr lang="it-IT" dirty="0"/>
             </a:br>
             <a:r>
               <a:rPr lang="it-IT" dirty="0" err="1"/>
-              <a:t>We</a:t>
+              <a:t>As</a:t>
             </a:r>
             <a:r>
               <a:rPr lang="it-IT" dirty="0"/>
@@ -9857,7 +10636,7 @@
             </a:r>
             <a:r>
               <a:rPr lang="it-IT" dirty="0" err="1"/>
-              <a:t>have</a:t>
+              <a:t>we</a:t>
             </a:r>
             <a:r>
               <a:rPr lang="it-IT" dirty="0"/>
@@ -9865,7 +10644,7 @@
             </a:r>
             <a:r>
               <a:rPr lang="it-IT" dirty="0" err="1"/>
-              <a:t>as</a:t>
+              <a:t>already</a:t>
             </a:r>
             <a:r>
               <a:rPr lang="it-IT" dirty="0"/>
@@ -9873,6 +10652,22 @@
             </a:r>
             <a:r>
               <a:rPr lang="it-IT" dirty="0" err="1"/>
+              <a:t>highlighted</a:t>
+            </a:r>
+            <a:r>
+              <a:rPr lang="it-IT" dirty="0"/>
+              <a:t> in the </a:t>
+            </a:r>
+            <a:r>
+              <a:rPr lang="it-IT" dirty="0" err="1"/>
+              <a:t>previous</a:t>
+            </a:r>
+            <a:r>
+              <a:rPr lang="it-IT" dirty="0"/>
+              <a:t> slides </a:t>
+            </a:r>
+            <a:r>
+              <a:rPr lang="it-IT" dirty="0" err="1"/>
               <a:t>we</a:t>
             </a:r>
             <a:r>
@@ -9881,19 +10676,21 @@
             </a:r>
             <a:r>
               <a:rPr lang="it-IT" dirty="0" err="1"/>
-              <a:t>said</a:t>
+              <a:t>have</a:t>
             </a:r>
             <a:r>
               <a:rPr lang="it-IT" dirty="0"/>
-              <a:t> in </a:t>
-            </a:r>
-            <a:r>
-              <a:rPr lang="it-IT" dirty="0" err="1"/>
-              <a:t>previous</a:t>
-            </a:r>
+              <a:t>:</a:t>
+            </a:r>
+          </a:p>
+          <a:p>
+            <a:pPr marL="228600" indent="-228600">
+              <a:buFont typeface="+mj-lt"/>
+              <a:buAutoNum type="arabicPeriod"/>
+            </a:pPr>
             <a:r>
               <a:rPr lang="it-IT" dirty="0"/>
-              <a:t> slide the </a:t>
+              <a:t>the </a:t>
             </a:r>
             <a:r>
               <a:rPr lang="it-IT" dirty="0" err="1"/>
@@ -9901,7 +10698,7 @@
             </a:r>
             <a:r>
               <a:rPr lang="it-IT" dirty="0"/>
-              <a:t>, the </a:t>
+              <a:t> and </a:t>
             </a:r>
             <a:r>
               <a:rPr lang="it-IT" dirty="0" err="1"/>
@@ -9927,9 +10724,27 @@
               <a:rPr lang="it-IT" dirty="0"/>
               <a:t>, </a:t>
             </a:r>
+          </a:p>
+          <a:p>
+            <a:pPr marL="228600" indent="-228600">
+              <a:buFont typeface="+mj-lt"/>
+              <a:buAutoNum type="arabicPeriod"/>
+            </a:pPr>
+            <a:r>
+              <a:rPr lang="it-IT" dirty="0"/>
+              <a:t>the </a:t>
+            </a:r>
             <a:r>
               <a:rPr lang="it-IT" dirty="0" err="1"/>
-              <a:t>then</a:t>
+              <a:t>ability</a:t>
+            </a:r>
+            <a:r>
+              <a:rPr lang="it-IT" dirty="0"/>
+              <a:t> to </a:t>
+            </a:r>
+            <a:r>
+              <a:rPr lang="it-IT" dirty="0" err="1"/>
+              <a:t>see</a:t>
             </a:r>
             <a:r>
               <a:rPr lang="it-IT" dirty="0"/>
@@ -9937,27 +10752,111 @@
             </a:r>
             <a:r>
               <a:rPr lang="it-IT" dirty="0" err="1"/>
-              <a:t>ability</a:t>
+              <a:t>result</a:t>
             </a:r>
             <a:r>
               <a:rPr lang="it-IT" dirty="0"/>
-              <a:t> to </a:t>
+              <a:t> </a:t>
+            </a:r>
+          </a:p>
+          <a:p>
+            <a:pPr marL="228600" indent="-228600">
+              <a:buFont typeface="+mj-lt"/>
+              <a:buAutoNum type="arabicPeriod"/>
+            </a:pPr>
+            <a:r>
+              <a:rPr lang="it-IT" dirty="0"/>
+              <a:t>the feature to create and </a:t>
             </a:r>
             <a:r>
               <a:rPr lang="it-IT" dirty="0" err="1"/>
-              <a:t>see</a:t>
+              <a:t>manage</a:t>
             </a:r>
             <a:r>
               <a:rPr lang="it-IT" dirty="0"/>
-              <a:t> the </a:t>
+              <a:t> the badges.</a:t>
+            </a:r>
+          </a:p>
+          <a:p>
+            <a:endParaRPr lang="it-IT" dirty="0"/>
+          </a:p>
+          <a:p>
+            <a:pPr marL="0" marR="0" lvl="0" indent="0" algn="l" defTabSz="914400" rtl="0" eaLnBrk="1" fontAlgn="auto" latinLnBrk="0" hangingPunct="1">
+              <a:lnSpc>
+                <a:spcPct val="100000"/>
+              </a:lnSpc>
+              <a:spcBef>
+                <a:spcPts val="0"/>
+              </a:spcBef>
+              <a:spcAft>
+                <a:spcPts val="0"/>
+              </a:spcAft>
+              <a:buClrTx/>
+              <a:buSzTx/>
+              <a:buFontTx/>
+              <a:buNone/>
+              <a:tabLst/>
+              <a:defRPr/>
+            </a:pPr>
+            <a:r>
+              <a:rPr lang="it-IT" dirty="0"/>
+              <a:t>After </a:t>
             </a:r>
             <a:r>
               <a:rPr lang="it-IT" dirty="0" err="1"/>
-              <a:t>result</a:t>
+              <a:t>this</a:t>
             </a:r>
             <a:r>
               <a:rPr lang="it-IT" dirty="0"/>
-              <a:t> and the feature to create the badges.</a:t>
+              <a:t> slide </a:t>
+            </a:r>
+            <a:r>
+              <a:rPr lang="it-IT" b="1" dirty="0" err="1"/>
+              <a:t>change</a:t>
+            </a:r>
+            <a:r>
+              <a:rPr lang="it-IT" b="1" dirty="0"/>
+              <a:t> </a:t>
+            </a:r>
+            <a:r>
+              <a:rPr lang="it-IT" b="1" dirty="0" err="1"/>
+              <a:t>person</a:t>
+            </a:r>
+            <a:r>
+              <a:rPr lang="it-IT" b="1" dirty="0"/>
+              <a:t> </a:t>
+            </a:r>
+            <a:r>
+              <a:rPr lang="it-IT" b="1" dirty="0" err="1"/>
+              <a:t>speaking</a:t>
+            </a:r>
+            <a:r>
+              <a:rPr lang="it-IT" b="1" dirty="0"/>
+              <a:t> (</a:t>
+            </a:r>
+            <a:r>
+              <a:rPr lang="it-IT" b="1" dirty="0" err="1"/>
+              <a:t>Ferlin</a:t>
+            </a:r>
+            <a:r>
+              <a:rPr lang="it-IT" b="1" dirty="0"/>
+              <a:t> </a:t>
+            </a:r>
+            <a:r>
+              <a:rPr lang="it-IT" b="1" dirty="0" err="1"/>
+              <a:t>now</a:t>
+            </a:r>
+            <a:r>
+              <a:rPr lang="it-IT" b="1" dirty="0"/>
+              <a:t> </a:t>
+            </a:r>
+            <a:r>
+              <a:rPr lang="it-IT" b="1" dirty="0" err="1"/>
+              <a:t>talking</a:t>
+            </a:r>
+            <a:r>
+              <a:rPr lang="it-IT" b="1" dirty="0"/>
+              <a:t>)</a:t>
             </a:r>
           </a:p>
           <a:p>
@@ -31122,7 +32021,11 @@
             </a:r>
             <a:r>
               <a:rPr lang="en-US" dirty="0"/>
-              <a:t>The system shall allow the educator to create a tournament</a:t>
+              <a:t>The system shall allow the educator to </a:t>
+            </a:r>
+            <a:r>
+              <a:rPr lang="en-US" b="1" i="1" dirty="0"/>
+              <a:t>create a tournament</a:t>
             </a:r>
           </a:p>
           <a:p>
@@ -31172,9 +32075,13 @@
             </a:r>
             <a:r>
               <a:rPr lang="en-US" dirty="0"/>
-              <a:t>The system shall allow students to subscribe to a tournament</a:t>
-            </a:r>
-            <a:endParaRPr lang="it-IT" dirty="0"/>
+              <a:t>The system shall allow students to </a:t>
+            </a:r>
+            <a:r>
+              <a:rPr lang="en-US" b="1" i="1" dirty="0"/>
+              <a:t>subscribe to a tournament</a:t>
+            </a:r>
+            <a:endParaRPr lang="it-IT" b="1" i="1" dirty="0"/>
           </a:p>
         </p:txBody>
       </p:sp>
@@ -31216,7 +32123,15 @@
             </a:r>
             <a:r>
               <a:rPr lang="en-US" dirty="0"/>
-              <a:t>The system shall allow the educator to create a battle within the context of a specific tournament.</a:t>
+              <a:t>The system shall allow the educator to </a:t>
+            </a:r>
+            <a:r>
+              <a:rPr lang="en-US" b="1" i="1" dirty="0"/>
+              <a:t>create a battle </a:t>
+            </a:r>
+            <a:r>
+              <a:rPr lang="en-US" dirty="0"/>
+              <a:t>within the context of a specific tournament.</a:t>
             </a:r>
           </a:p>
           <a:p>
@@ -31266,7 +32181,15 @@
             </a:r>
             <a:r>
               <a:rPr lang="en-US" dirty="0"/>
-              <a:t>The system shall allow students to join a battle, respecting the minimum </a:t>
+              <a:t>The system shall allow students to </a:t>
+            </a:r>
+            <a:r>
+              <a:rPr lang="en-US" b="1" i="1" dirty="0"/>
+              <a:t>join a battle</a:t>
+            </a:r>
+            <a:r>
+              <a:rPr lang="en-US" dirty="0"/>
+              <a:t>, respecting the minimum </a:t>
             </a:r>
           </a:p>
           <a:p>
@@ -31322,7 +32245,15 @@
             </a:r>
             <a:r>
               <a:rPr lang="en-US" dirty="0"/>
-              <a:t>The system shall expose an API that can by called by the GitHub Action platform</a:t>
+              <a:t>The system shall </a:t>
+            </a:r>
+            <a:r>
+              <a:rPr lang="en-US" b="1" i="1" dirty="0"/>
+              <a:t>expose an API </a:t>
+            </a:r>
+            <a:r>
+              <a:rPr lang="en-US" dirty="0"/>
+              <a:t>that can by called by the GitHub Action platform</a:t>
             </a:r>
             <a:endParaRPr lang="it-IT" dirty="0"/>
           </a:p>
@@ -31366,7 +32297,15 @@
             </a:r>
             <a:r>
               <a:rPr lang="en-US" dirty="0"/>
-              <a:t>On each push, the system shall calculate and update the battle score of the team</a:t>
+              <a:t>On each push, the system shall </a:t>
+            </a:r>
+            <a:r>
+              <a:rPr lang="en-US" b="1" i="1" dirty="0"/>
+              <a:t>calculate and update the battle score </a:t>
+            </a:r>
+            <a:r>
+              <a:rPr lang="en-US" dirty="0"/>
+              <a:t>of the team</a:t>
             </a:r>
             <a:br>
               <a:rPr lang="en-US" dirty="0"/>
@@ -31417,7 +32356,15 @@
             </a:r>
             <a:r>
               <a:rPr lang="en-US" dirty="0"/>
-              <a:t>The system shall allow the educator who create a tournament, to create badges within </a:t>
+              <a:t>The system shall allow the educator who create a tournament, to </a:t>
+            </a:r>
+            <a:r>
+              <a:rPr lang="en-US" b="1" i="1" dirty="0"/>
+              <a:t>create badges </a:t>
+            </a:r>
+            <a:r>
+              <a:rPr lang="en-US" dirty="0"/>
+              <a:t>within </a:t>
             </a:r>
           </a:p>
           <a:p>

</xml_diff>

<commit_message>
Add note and fix times
</commit_message>
<xml_diff>
--- a/presentation/Presentation - Ferlin Orsenigo Saccani.pptx
+++ b/presentation/Presentation - Ferlin Orsenigo Saccani.pptx
@@ -4909,7 +4909,7 @@
           <a:p>
             <a:fld id="{7202ABAD-4209-4CCF-B9B2-BA8F1A4DE14A}" type="datetimeFigureOut">
               <a:rPr lang="it-IT" smtClean="0"/>
-              <a:t>26/01/2024</a:t>
+              <a:t>29/01/2024</a:t>
             </a:fld>
             <a:endParaRPr lang="it-IT"/>
           </a:p>
@@ -6065,6 +6065,206 @@
                   <a:srgbClr val="FF0000"/>
                 </a:solidFill>
               </a:rPr>
+              <a:t>Low </a:t>
+            </a:r>
+            <a:r>
+              <a:rPr lang="it-IT" b="1" dirty="0" err="1">
+                <a:solidFill>
+                  <a:srgbClr val="FF0000"/>
+                </a:solidFill>
+              </a:rPr>
+              <a:t>coupling</a:t>
+            </a:r>
+            <a:r>
+              <a:rPr lang="it-IT" b="1" dirty="0">
+                <a:solidFill>
+                  <a:srgbClr val="FF0000"/>
+                </a:solidFill>
+              </a:rPr>
+              <a:t>: </a:t>
+            </a:r>
+            <a:r>
+              <a:rPr lang="it-IT" b="0" dirty="0" err="1">
+                <a:solidFill>
+                  <a:srgbClr val="FF0000"/>
+                </a:solidFill>
+              </a:rPr>
+              <a:t>each</a:t>
+            </a:r>
+            <a:r>
+              <a:rPr lang="it-IT" b="0" dirty="0">
+                <a:solidFill>
+                  <a:srgbClr val="FF0000"/>
+                </a:solidFill>
+              </a:rPr>
+              <a:t> </a:t>
+            </a:r>
+            <a:r>
+              <a:rPr lang="it-IT" b="0" dirty="0" err="1">
+                <a:solidFill>
+                  <a:srgbClr val="FF0000"/>
+                </a:solidFill>
+              </a:rPr>
+              <a:t>microservice</a:t>
+            </a:r>
+            <a:r>
+              <a:rPr lang="it-IT" b="0" dirty="0">
+                <a:solidFill>
+                  <a:srgbClr val="FF0000"/>
+                </a:solidFill>
+              </a:rPr>
+              <a:t> </a:t>
+            </a:r>
+            <a:r>
+              <a:rPr lang="it-IT" b="0" dirty="0" err="1">
+                <a:solidFill>
+                  <a:srgbClr val="FF0000"/>
+                </a:solidFill>
+              </a:rPr>
+              <a:t>is</a:t>
+            </a:r>
+            <a:r>
+              <a:rPr lang="it-IT" b="0" dirty="0">
+                <a:solidFill>
+                  <a:srgbClr val="FF0000"/>
+                </a:solidFill>
+              </a:rPr>
+              <a:t> </a:t>
+            </a:r>
+            <a:r>
+              <a:rPr lang="it-IT" b="0" dirty="0" err="1">
+                <a:solidFill>
+                  <a:srgbClr val="FF0000"/>
+                </a:solidFill>
+              </a:rPr>
+              <a:t>independent</a:t>
+            </a:r>
+            <a:r>
+              <a:rPr lang="it-IT" b="0" dirty="0">
+                <a:solidFill>
+                  <a:srgbClr val="FF0000"/>
+                </a:solidFill>
+              </a:rPr>
+              <a:t> of the </a:t>
+            </a:r>
+            <a:r>
+              <a:rPr lang="it-IT" b="0" dirty="0" err="1">
+                <a:solidFill>
+                  <a:srgbClr val="FF0000"/>
+                </a:solidFill>
+              </a:rPr>
+              <a:t>others</a:t>
+            </a:r>
+            <a:endParaRPr lang="it-IT" b="0" dirty="0">
+              <a:solidFill>
+                <a:srgbClr val="FF0000"/>
+              </a:solidFill>
+            </a:endParaRPr>
+          </a:p>
+          <a:p>
+            <a:pPr marL="0" marR="0" lvl="0" indent="0" algn="l" defTabSz="914400" rtl="0" eaLnBrk="1" fontAlgn="auto" latinLnBrk="0" hangingPunct="1">
+              <a:lnSpc>
+                <a:spcPct val="100000"/>
+              </a:lnSpc>
+              <a:spcBef>
+                <a:spcPts val="0"/>
+              </a:spcBef>
+              <a:spcAft>
+                <a:spcPts val="0"/>
+              </a:spcAft>
+              <a:buClrTx/>
+              <a:buSzTx/>
+              <a:buFontTx/>
+              <a:buNone/>
+              <a:tabLst/>
+              <a:defRPr/>
+            </a:pPr>
+            <a:r>
+              <a:rPr lang="it-IT" b="1" dirty="0">
+                <a:solidFill>
+                  <a:srgbClr val="FF0000"/>
+                </a:solidFill>
+              </a:rPr>
+              <a:t>High </a:t>
+            </a:r>
+            <a:r>
+              <a:rPr lang="it-IT" b="1" dirty="0" err="1">
+                <a:solidFill>
+                  <a:srgbClr val="FF0000"/>
+                </a:solidFill>
+              </a:rPr>
+              <a:t>cohesion</a:t>
+            </a:r>
+            <a:r>
+              <a:rPr lang="it-IT" b="1" dirty="0">
+                <a:solidFill>
+                  <a:srgbClr val="FF0000"/>
+                </a:solidFill>
+              </a:rPr>
+              <a:t>: </a:t>
+            </a:r>
+            <a:r>
+              <a:rPr lang="en-US" b="0" dirty="0">
+                <a:solidFill>
+                  <a:srgbClr val="FF0000"/>
+                </a:solidFill>
+              </a:rPr>
+              <a:t>the tasks performed by each microservice are related</a:t>
+            </a:r>
+            <a:endParaRPr lang="it-IT" b="1" dirty="0">
+              <a:solidFill>
+                <a:srgbClr val="FF0000"/>
+              </a:solidFill>
+            </a:endParaRPr>
+          </a:p>
+          <a:p>
+            <a:pPr marL="0" marR="0" lvl="0" indent="0" algn="l" defTabSz="914400" rtl="0" eaLnBrk="1" fontAlgn="auto" latinLnBrk="0" hangingPunct="1">
+              <a:lnSpc>
+                <a:spcPct val="100000"/>
+              </a:lnSpc>
+              <a:spcBef>
+                <a:spcPts val="0"/>
+              </a:spcBef>
+              <a:spcAft>
+                <a:spcPts val="0"/>
+              </a:spcAft>
+              <a:buClrTx/>
+              <a:buSzTx/>
+              <a:buFontTx/>
+              <a:buNone/>
+              <a:tabLst/>
+              <a:defRPr/>
+            </a:pPr>
+            <a:endParaRPr lang="it-IT" b="1" dirty="0">
+              <a:solidFill>
+                <a:srgbClr val="FF0000"/>
+              </a:solidFill>
+            </a:endParaRPr>
+          </a:p>
+          <a:p>
+            <a:pPr marL="0" marR="0" lvl="0" indent="0" algn="l" defTabSz="914400" rtl="0" eaLnBrk="1" fontAlgn="auto" latinLnBrk="0" hangingPunct="1">
+              <a:lnSpc>
+                <a:spcPct val="100000"/>
+              </a:lnSpc>
+              <a:spcBef>
+                <a:spcPts val="0"/>
+              </a:spcBef>
+              <a:spcAft>
+                <a:spcPts val="0"/>
+              </a:spcAft>
+              <a:buClrTx/>
+              <a:buSzTx/>
+              <a:buFontTx/>
+              <a:buNone/>
+              <a:tabLst/>
+              <a:defRPr/>
+            </a:pPr>
+            <a:r>
+              <a:rPr lang="it-IT" b="1" dirty="0">
+                <a:solidFill>
+                  <a:srgbClr val="FF0000"/>
+                </a:solidFill>
+              </a:rPr>
               <a:t>4,15s-4,55s</a:t>
             </a:r>
           </a:p>
@@ -6293,6 +6493,26 @@
               <a:rPr lang="it-IT" dirty="0" err="1"/>
               <a:t>components</a:t>
             </a:r>
+            <a:endParaRPr lang="it-IT" dirty="0"/>
+          </a:p>
+          <a:p>
+            <a:pPr marL="0" marR="0" lvl="0" indent="0" algn="l" defTabSz="914400" rtl="0" eaLnBrk="1" fontAlgn="auto" latinLnBrk="0" hangingPunct="1">
+              <a:lnSpc>
+                <a:spcPct val="100000"/>
+              </a:lnSpc>
+              <a:spcBef>
+                <a:spcPts val="0"/>
+              </a:spcBef>
+              <a:spcAft>
+                <a:spcPts val="0"/>
+              </a:spcAft>
+              <a:buClrTx/>
+              <a:buSzTx/>
+              <a:buFontTx/>
+              <a:buNone/>
+              <a:tabLst/>
+              <a:defRPr/>
+            </a:pPr>
             <a:br>
               <a:rPr lang="it-IT" dirty="0"/>
             </a:br>
@@ -6552,7 +6772,7 @@
                   <a:srgbClr val="FF0000"/>
                 </a:solidFill>
               </a:rPr>
-              <a:t>5,00s-5,50s</a:t>
+              <a:t>5,00s-5,35s</a:t>
             </a:r>
           </a:p>
           <a:p>
@@ -6721,7 +6941,7 @@
             </a:r>
             <a:r>
               <a:rPr lang="it-IT" dirty="0" err="1"/>
-              <a:t>allow</a:t>
+              <a:t>allows</a:t>
             </a:r>
             <a:r>
               <a:rPr lang="it-IT" dirty="0"/>
@@ -6936,7 +7156,7 @@
                   <a:srgbClr val="FF0000"/>
                 </a:solidFill>
               </a:rPr>
-              <a:t>5,50s-6,20s</a:t>
+              <a:t>5,35s-6,05s</a:t>
             </a:r>
           </a:p>
           <a:p>
@@ -7026,7 +7246,7 @@
           <a:p>
             <a:r>
               <a:rPr lang="it-IT" dirty="0" err="1"/>
-              <a:t>Those</a:t>
+              <a:t>These</a:t>
             </a:r>
             <a:r>
               <a:rPr lang="it-IT" dirty="0"/>
@@ -7038,7 +7258,17 @@
             </a:r>
             <a:r>
               <a:rPr lang="it-IT" dirty="0"/>
-              <a:t> of the api gateway and note </a:t>
+              <a:t> of the api gateway.</a:t>
+            </a:r>
+          </a:p>
+          <a:p>
+            <a:r>
+              <a:rPr lang="it-IT" dirty="0" err="1"/>
+              <a:t>We</a:t>
+            </a:r>
+            <a:r>
+              <a:rPr lang="it-IT" dirty="0"/>
+              <a:t> can note </a:t>
             </a:r>
             <a:r>
               <a:rPr lang="it-IT" dirty="0" err="1"/>
@@ -7078,15 +7308,15 @@
             </a:r>
             <a:r>
               <a:rPr lang="it-IT" dirty="0"/>
-              <a:t> </a:t>
+              <a:t> the api gateway </a:t>
             </a:r>
             <a:r>
               <a:rPr lang="it-IT" dirty="0" err="1"/>
-              <a:t>it’s</a:t>
+              <a:t>is</a:t>
             </a:r>
             <a:r>
               <a:rPr lang="it-IT" dirty="0"/>
-              <a:t> the api gateway in </a:t>
+              <a:t> in </a:t>
             </a:r>
             <a:r>
               <a:rPr lang="it-IT" dirty="0" err="1"/>
@@ -7094,7 +7324,15 @@
             </a:r>
             <a:r>
               <a:rPr lang="it-IT" dirty="0"/>
-              <a:t> to validate </a:t>
+              <a:t> of </a:t>
+            </a:r>
+            <a:r>
+              <a:rPr lang="it-IT" dirty="0" err="1"/>
+              <a:t>validating</a:t>
+            </a:r>
+            <a:r>
+              <a:rPr lang="it-IT" dirty="0"/>
+              <a:t> </a:t>
             </a:r>
             <a:r>
               <a:rPr lang="it-IT" dirty="0" err="1"/>
@@ -7102,7 +7340,7 @@
             </a:r>
             <a:r>
               <a:rPr lang="it-IT" dirty="0"/>
-              <a:t> </a:t>
+              <a:t>, </a:t>
             </a:r>
             <a:r>
               <a:rPr lang="it-IT" dirty="0" err="1"/>
@@ -7222,7 +7460,7 @@
                   <a:srgbClr val="FF0000"/>
                 </a:solidFill>
               </a:rPr>
-              <a:t>6,20s-6,50s</a:t>
+              <a:t>6,05s-6,35s</a:t>
             </a:r>
           </a:p>
           <a:p>
@@ -7643,7 +7881,7 @@
                   <a:srgbClr val="FF0000"/>
                 </a:solidFill>
               </a:rPr>
-              <a:t>6,50s-7,40s</a:t>
+              <a:t>6,35s-7,25s</a:t>
             </a:r>
           </a:p>
           <a:p>
@@ -8406,7 +8644,7 @@
                   <a:srgbClr val="FF0000"/>
                 </a:solidFill>
               </a:rPr>
-              <a:t>7,40s-8,15s</a:t>
+              <a:t>7,25s-8,00s</a:t>
             </a:r>
           </a:p>
           <a:p>
@@ -8722,7 +8960,7 @@
                   <a:srgbClr val="FF0000"/>
                 </a:solidFill>
               </a:rPr>
-              <a:t>8,15s-8,45s</a:t>
+              <a:t>8,00s-8,30s</a:t>
             </a:r>
           </a:p>
           <a:p>
@@ -8853,7 +9091,7 @@
                   <a:srgbClr val="FF0000"/>
                 </a:solidFill>
               </a:rPr>
-              <a:t>8,45s-9,45s</a:t>
+              <a:t>8,30s-9,30s</a:t>
             </a:r>
           </a:p>
           <a:p>
@@ -9025,7 +9263,7 @@
                   <a:srgbClr val="FF0000"/>
                 </a:solidFill>
               </a:rPr>
-              <a:t>9,45s-10,00s</a:t>
+              <a:t>9,30s-9,45s</a:t>
             </a:r>
           </a:p>
           <a:p>
@@ -9136,7 +9374,7 @@
                   <a:srgbClr val="FF0000"/>
                 </a:solidFill>
               </a:rPr>
-              <a:t>10,00s-10,20s</a:t>
+              <a:t>9,45s-10,05s</a:t>
             </a:r>
           </a:p>
           <a:p>
@@ -9243,7 +9481,7 @@
             </a:pPr>
             <a:r>
               <a:rPr lang="it-IT" b="1" dirty="0"/>
-              <a:t>10,20s-10,35s</a:t>
+              <a:t>10,05s-10,20s</a:t>
             </a:r>
           </a:p>
           <a:p>
@@ -11520,7 +11758,7 @@
           <a:p>
             <a:fld id="{E5A64DBF-7161-4EA8-95C9-E19D638F8A86}" type="datetime1">
               <a:rPr lang="it-IT" smtClean="0"/>
-              <a:t>26/01/2024</a:t>
+              <a:t>29/01/2024</a:t>
             </a:fld>
             <a:endParaRPr lang="en-US"/>
           </a:p>
@@ -11692,7 +11930,7 @@
           <a:p>
             <a:fld id="{E215BCEA-145B-4DD8-BFB8-2B5F347EE37B}" type="datetime1">
               <a:rPr lang="it-IT" smtClean="0"/>
-              <a:t>26/01/2024</a:t>
+              <a:t>29/01/2024</a:t>
             </a:fld>
             <a:endParaRPr lang="en-US"/>
           </a:p>
@@ -11874,7 +12112,7 @@
           <a:p>
             <a:fld id="{0E479271-4B3A-4899-BE3D-A5B5388EB193}" type="datetime1">
               <a:rPr lang="it-IT" smtClean="0"/>
-              <a:t>26/01/2024</a:t>
+              <a:t>29/01/2024</a:t>
             </a:fld>
             <a:endParaRPr lang="en-US"/>
           </a:p>
@@ -12112,7 +12350,7 @@
           <a:p>
             <a:fld id="{0B13A35A-4FB3-4273-A700-E6041718318E}" type="datetime1">
               <a:rPr lang="it-IT" smtClean="0"/>
-              <a:t>26/01/2024</a:t>
+              <a:t>29/01/2024</a:t>
             </a:fld>
             <a:endParaRPr lang="it-IT" dirty="0"/>
           </a:p>
@@ -12295,7 +12533,7 @@
           <a:p>
             <a:fld id="{29104CC2-F95F-45F0-913D-F36C99762219}" type="datetime1">
               <a:rPr lang="it-IT" smtClean="0"/>
-              <a:t>26/01/2024</a:t>
+              <a:t>29/01/2024</a:t>
             </a:fld>
             <a:endParaRPr lang="en-US"/>
           </a:p>
@@ -12544,7 +12782,7 @@
           <a:p>
             <a:fld id="{06648BC1-280A-4E50-A272-AA116EA42599}" type="datetime1">
               <a:rPr lang="it-IT" smtClean="0"/>
-              <a:t>26/01/2024</a:t>
+              <a:t>29/01/2024</a:t>
             </a:fld>
             <a:endParaRPr lang="en-US"/>
           </a:p>
@@ -12777,7 +13015,7 @@
           <a:p>
             <a:fld id="{D32BB0D9-996D-47AA-BD91-66DF540EFC2A}" type="datetime1">
               <a:rPr lang="it-IT" smtClean="0"/>
-              <a:t>26/01/2024</a:t>
+              <a:t>29/01/2024</a:t>
             </a:fld>
             <a:endParaRPr lang="en-US"/>
           </a:p>
@@ -13145,7 +13383,7 @@
           <a:p>
             <a:fld id="{7F46B0A3-2298-4D03-B0C3-43C4FC666B6B}" type="datetime1">
               <a:rPr lang="it-IT" smtClean="0"/>
-              <a:t>26/01/2024</a:t>
+              <a:t>29/01/2024</a:t>
             </a:fld>
             <a:endParaRPr lang="en-US"/>
           </a:p>
@@ -13266,7 +13504,7 @@
           <a:p>
             <a:fld id="{9498587E-2DC0-4A5E-8AED-CF7575629163}" type="datetime1">
               <a:rPr lang="it-IT" smtClean="0"/>
-              <a:t>26/01/2024</a:t>
+              <a:t>29/01/2024</a:t>
             </a:fld>
             <a:endParaRPr lang="en-US"/>
           </a:p>
@@ -13365,7 +13603,7 @@
           <a:p>
             <a:fld id="{9EFD05EE-AC27-4DD7-A212-18D7350A6914}" type="datetime1">
               <a:rPr lang="it-IT" smtClean="0"/>
-              <a:t>26/01/2024</a:t>
+              <a:t>29/01/2024</a:t>
             </a:fld>
             <a:endParaRPr lang="en-US"/>
           </a:p>
@@ -13644,7 +13882,7 @@
           <a:p>
             <a:fld id="{401F7625-73EE-4A54-8E51-142CFE45A555}" type="datetime1">
               <a:rPr lang="it-IT" smtClean="0"/>
-              <a:t>26/01/2024</a:t>
+              <a:t>29/01/2024</a:t>
             </a:fld>
             <a:endParaRPr lang="en-US"/>
           </a:p>
@@ -13900,7 +14138,7 @@
           <a:p>
             <a:fld id="{26591E3B-AF6F-45F2-BB77-5E2C0987DC7A}" type="datetime1">
               <a:rPr lang="it-IT" smtClean="0"/>
-              <a:t>26/01/2024</a:t>
+              <a:t>29/01/2024</a:t>
             </a:fld>
             <a:endParaRPr lang="en-US"/>
           </a:p>
@@ -14115,7 +14353,7 @@
           <a:p>
             <a:fld id="{BB7AE348-75D9-4CB5-8FE3-6812842EA045}" type="datetime1">
               <a:rPr lang="it-IT" smtClean="0"/>
-              <a:t>26/01/2024</a:t>
+              <a:t>29/01/2024</a:t>
             </a:fld>
             <a:endParaRPr lang="en-US"/>
           </a:p>
@@ -17336,11 +17574,11 @@
   <p:clrMapOvr>
     <a:masterClrMapping/>
   </p:clrMapOvr>
-  <mc:AlternateContent xmlns:mc="http://schemas.openxmlformats.org/markup-compatibility/2006">
-    <mc:Choice xmlns:p14="http://schemas.microsoft.com/office/powerpoint/2010/main" Requires="p14">
+  <mc:AlternateContent xmlns:mc="http://schemas.openxmlformats.org/markup-compatibility/2006" xmlns:p14="http://schemas.microsoft.com/office/powerpoint/2010/main">
+    <mc:Choice Requires="p14">
       <p:transition spd="slow" p14:dur="2000" advTm="7440"/>
     </mc:Choice>
-    <mc:Fallback>
+    <mc:Fallback xmlns="">
       <p:transition spd="slow" advTm="7440"/>
     </mc:Fallback>
   </mc:AlternateContent>
@@ -17514,11 +17752,11 @@
   <p:clrMapOvr>
     <a:masterClrMapping/>
   </p:clrMapOvr>
-  <mc:AlternateContent xmlns:mc="http://schemas.openxmlformats.org/markup-compatibility/2006">
-    <mc:Choice xmlns:p14="http://schemas.microsoft.com/office/powerpoint/2010/main" Requires="p14">
+  <mc:AlternateContent xmlns:mc="http://schemas.openxmlformats.org/markup-compatibility/2006" xmlns:p14="http://schemas.microsoft.com/office/powerpoint/2010/main">
+    <mc:Choice Requires="p14">
       <p:transition spd="slow" p14:dur="2000" advTm="55467"/>
     </mc:Choice>
-    <mc:Fallback>
+    <mc:Fallback xmlns="">
       <p:transition spd="slow" advTm="55467"/>
     </mc:Fallback>
   </mc:AlternateContent>
@@ -17816,11 +18054,11 @@
   <p:clrMapOvr>
     <a:masterClrMapping/>
   </p:clrMapOvr>
-  <mc:AlternateContent xmlns:mc="http://schemas.openxmlformats.org/markup-compatibility/2006">
-    <mc:Choice xmlns:p14="http://schemas.microsoft.com/office/powerpoint/2010/main" Requires="p14">
+  <mc:AlternateContent xmlns:mc="http://schemas.openxmlformats.org/markup-compatibility/2006" xmlns:p14="http://schemas.microsoft.com/office/powerpoint/2010/main">
+    <mc:Choice Requires="p14">
       <p:transition spd="slow" p14:dur="2000" advTm="12117"/>
     </mc:Choice>
-    <mc:Fallback>
+    <mc:Fallback xmlns="">
       <p:transition spd="slow" advTm="12117"/>
     </mc:Fallback>
   </mc:AlternateContent>
@@ -17963,11 +18201,11 @@
   <p:clrMapOvr>
     <a:masterClrMapping/>
   </p:clrMapOvr>
-  <mc:AlternateContent xmlns:mc="http://schemas.openxmlformats.org/markup-compatibility/2006">
-    <mc:Choice xmlns:p14="http://schemas.microsoft.com/office/powerpoint/2010/main" Requires="p14">
+  <mc:AlternateContent xmlns:mc="http://schemas.openxmlformats.org/markup-compatibility/2006" xmlns:p14="http://schemas.microsoft.com/office/powerpoint/2010/main">
+    <mc:Choice Requires="p14">
       <p:transition spd="slow" p14:dur="2000" advTm="511"/>
     </mc:Choice>
-    <mc:Fallback>
+    <mc:Fallback xmlns="">
       <p:transition spd="slow" advTm="511"/>
     </mc:Fallback>
   </mc:AlternateContent>
@@ -18347,11 +18585,11 @@
   <p:clrMapOvr>
     <a:masterClrMapping/>
   </p:clrMapOvr>
-  <mc:AlternateContent xmlns:mc="http://schemas.openxmlformats.org/markup-compatibility/2006">
-    <mc:Choice xmlns:p14="http://schemas.microsoft.com/office/powerpoint/2010/main" Requires="p14">
+  <mc:AlternateContent xmlns:mc="http://schemas.openxmlformats.org/markup-compatibility/2006" xmlns:p14="http://schemas.microsoft.com/office/powerpoint/2010/main">
+    <mc:Choice Requires="p14">
       <p:transition spd="slow" p14:dur="2000" advTm="39576"/>
     </mc:Choice>
-    <mc:Fallback>
+    <mc:Fallback xmlns="">
       <p:transition spd="slow" advTm="39576"/>
     </mc:Fallback>
   </mc:AlternateContent>
@@ -19018,11 +19256,11 @@
   <p:clrMapOvr>
     <a:masterClrMapping/>
   </p:clrMapOvr>
-  <mc:AlternateContent xmlns:mc="http://schemas.openxmlformats.org/markup-compatibility/2006">
-    <mc:Choice xmlns:p14="http://schemas.microsoft.com/office/powerpoint/2010/main" Requires="p14">
+  <mc:AlternateContent xmlns:mc="http://schemas.openxmlformats.org/markup-compatibility/2006" xmlns:p14="http://schemas.microsoft.com/office/powerpoint/2010/main">
+    <mc:Choice Requires="p14">
       <p:transition spd="slow" p14:dur="2000" advTm="5738"/>
     </mc:Choice>
-    <mc:Fallback>
+    <mc:Fallback xmlns="">
       <p:transition spd="slow" advTm="5738"/>
     </mc:Fallback>
   </mc:AlternateContent>
@@ -19413,11 +19651,11 @@
   <p:clrMapOvr>
     <a:masterClrMapping/>
   </p:clrMapOvr>
-  <mc:AlternateContent xmlns:mc="http://schemas.openxmlformats.org/markup-compatibility/2006">
-    <mc:Choice xmlns:p14="http://schemas.microsoft.com/office/powerpoint/2010/main" Requires="p14">
+  <mc:AlternateContent xmlns:mc="http://schemas.openxmlformats.org/markup-compatibility/2006" xmlns:p14="http://schemas.microsoft.com/office/powerpoint/2010/main">
+    <mc:Choice Requires="p14">
       <p:transition spd="slow" p14:dur="2000" advTm="15618"/>
     </mc:Choice>
-    <mc:Fallback>
+    <mc:Fallback xmlns="">
       <p:transition spd="slow" advTm="15618"/>
     </mc:Fallback>
   </mc:AlternateContent>
@@ -20069,11 +20307,11 @@
   <p:clrMapOvr>
     <a:masterClrMapping/>
   </p:clrMapOvr>
-  <mc:AlternateContent xmlns:mc="http://schemas.openxmlformats.org/markup-compatibility/2006">
-    <mc:Choice xmlns:p14="http://schemas.microsoft.com/office/powerpoint/2010/main" Requires="p14">
+  <mc:AlternateContent xmlns:mc="http://schemas.openxmlformats.org/markup-compatibility/2006" xmlns:p14="http://schemas.microsoft.com/office/powerpoint/2010/main">
+    <mc:Choice Requires="p14">
       <p:transition spd="slow" p14:dur="2000" advTm="28084"/>
     </mc:Choice>
-    <mc:Fallback>
+    <mc:Fallback xmlns="">
       <p:transition spd="slow" advTm="28084"/>
     </mc:Fallback>
   </mc:AlternateContent>
@@ -20597,11 +20835,11 @@
   <p:clrMapOvr>
     <a:masterClrMapping/>
   </p:clrMapOvr>
-  <mc:AlternateContent xmlns:mc="http://schemas.openxmlformats.org/markup-compatibility/2006">
-    <mc:Choice xmlns:p14="http://schemas.microsoft.com/office/powerpoint/2010/main" Requires="p14">
+  <mc:AlternateContent xmlns:mc="http://schemas.openxmlformats.org/markup-compatibility/2006" xmlns:p14="http://schemas.microsoft.com/office/powerpoint/2010/main">
+    <mc:Choice Requires="p14">
       <p:transition spd="slow" p14:dur="2000" advTm="27538"/>
     </mc:Choice>
-    <mc:Fallback>
+    <mc:Fallback xmlns="">
       <p:transition spd="slow" advTm="27538"/>
     </mc:Fallback>
   </mc:AlternateContent>
@@ -21395,11 +21633,11 @@
   <p:clrMapOvr>
     <a:masterClrMapping/>
   </p:clrMapOvr>
-  <mc:AlternateContent xmlns:mc="http://schemas.openxmlformats.org/markup-compatibility/2006">
-    <mc:Choice xmlns:p14="http://schemas.microsoft.com/office/powerpoint/2010/main" Requires="p14">
+  <mc:AlternateContent xmlns:mc="http://schemas.openxmlformats.org/markup-compatibility/2006" xmlns:p14="http://schemas.microsoft.com/office/powerpoint/2010/main">
+    <mc:Choice Requires="p14">
       <p:transition spd="slow" p14:dur="2000" advTm="47021"/>
     </mc:Choice>
-    <mc:Fallback>
+    <mc:Fallback xmlns="">
       <p:transition spd="slow" advTm="47021"/>
     </mc:Fallback>
   </mc:AlternateContent>
@@ -22210,11 +22448,11 @@
   <p:clrMapOvr>
     <a:masterClrMapping/>
   </p:clrMapOvr>
-  <mc:AlternateContent xmlns:mc="http://schemas.openxmlformats.org/markup-compatibility/2006">
-    <mc:Choice xmlns:p14="http://schemas.microsoft.com/office/powerpoint/2010/main" Requires="p14">
+  <mc:AlternateContent xmlns:mc="http://schemas.openxmlformats.org/markup-compatibility/2006" xmlns:p14="http://schemas.microsoft.com/office/powerpoint/2010/main">
+    <mc:Choice Requires="p14">
       <p:transition spd="slow" p14:dur="2000" advTm="34083"/>
     </mc:Choice>
-    <mc:Fallback>
+    <mc:Fallback xmlns="">
       <p:transition spd="slow" advTm="34083"/>
     </mc:Fallback>
   </mc:AlternateContent>
@@ -22765,11 +23003,11 @@
   <p:clrMapOvr>
     <a:masterClrMapping/>
   </p:clrMapOvr>
-  <mc:AlternateContent xmlns:mc="http://schemas.openxmlformats.org/markup-compatibility/2006">
-    <mc:Choice xmlns:p14="http://schemas.microsoft.com/office/powerpoint/2010/main" Requires="p14">
+  <mc:AlternateContent xmlns:mc="http://schemas.openxmlformats.org/markup-compatibility/2006" xmlns:p14="http://schemas.microsoft.com/office/powerpoint/2010/main">
+    <mc:Choice Requires="p14">
       <p:transition spd="slow" p14:dur="2000" advTm="26989"/>
     </mc:Choice>
-    <mc:Fallback>
+    <mc:Fallback xmlns="">
       <p:transition spd="slow" advTm="26989"/>
     </mc:Fallback>
   </mc:AlternateContent>
@@ -23909,11 +24147,11 @@
   <p:clrMapOvr>
     <a:masterClrMapping/>
   </p:clrMapOvr>
-  <mc:AlternateContent xmlns:mc="http://schemas.openxmlformats.org/markup-compatibility/2006">
-    <mc:Choice xmlns:p14="http://schemas.microsoft.com/office/powerpoint/2010/main" Requires="p14">
+  <mc:AlternateContent xmlns:mc="http://schemas.openxmlformats.org/markup-compatibility/2006" xmlns:p14="http://schemas.microsoft.com/office/powerpoint/2010/main">
+    <mc:Choice Requires="p14">
       <p:transition spd="slow" p14:dur="2000" advTm="58973"/>
     </mc:Choice>
-    <mc:Fallback>
+    <mc:Fallback xmlns="">
       <p:transition spd="slow" advTm="58973"/>
     </mc:Fallback>
   </mc:AlternateContent>
@@ -24325,11 +24563,11 @@
   <p:clrMapOvr>
     <a:masterClrMapping/>
   </p:clrMapOvr>
-  <mc:AlternateContent xmlns:mc="http://schemas.openxmlformats.org/markup-compatibility/2006">
-    <mc:Choice xmlns:p14="http://schemas.microsoft.com/office/powerpoint/2010/main" Requires="p14">
+  <mc:AlternateContent xmlns:mc="http://schemas.openxmlformats.org/markup-compatibility/2006" xmlns:p14="http://schemas.microsoft.com/office/powerpoint/2010/main">
+    <mc:Choice Requires="p14">
       <p:transition spd="slow" p14:dur="2000" advTm="7507"/>
     </mc:Choice>
-    <mc:Fallback>
+    <mc:Fallback xmlns="">
       <p:transition spd="slow" advTm="7507"/>
     </mc:Fallback>
   </mc:AlternateContent>
@@ -25131,11 +25369,11 @@
   <p:clrMapOvr>
     <a:masterClrMapping/>
   </p:clrMapOvr>
-  <mc:AlternateContent xmlns:mc="http://schemas.openxmlformats.org/markup-compatibility/2006">
-    <mc:Choice xmlns:p14="http://schemas.microsoft.com/office/powerpoint/2010/main" Requires="p14">
+  <mc:AlternateContent xmlns:mc="http://schemas.openxmlformats.org/markup-compatibility/2006" xmlns:p14="http://schemas.microsoft.com/office/powerpoint/2010/main">
+    <mc:Choice Requires="p14">
       <p:transition spd="slow" p14:dur="2000" advTm="19269"/>
     </mc:Choice>
-    <mc:Fallback>
+    <mc:Fallback xmlns="">
       <p:transition spd="slow" advTm="19269"/>
     </mc:Fallback>
   </mc:AlternateContent>
@@ -25469,11 +25707,11 @@
   <p:clrMapOvr>
     <a:masterClrMapping/>
   </p:clrMapOvr>
-  <mc:AlternateContent xmlns:mc="http://schemas.openxmlformats.org/markup-compatibility/2006">
-    <mc:Choice xmlns:p14="http://schemas.microsoft.com/office/powerpoint/2010/main" Requires="p14">
+  <mc:AlternateContent xmlns:mc="http://schemas.openxmlformats.org/markup-compatibility/2006" xmlns:p14="http://schemas.microsoft.com/office/powerpoint/2010/main">
+    <mc:Choice Requires="p14">
       <p:transition spd="slow" p14:dur="2000" advTm="14806"/>
     </mc:Choice>
-    <mc:Fallback>
+    <mc:Fallback xmlns="">
       <p:transition spd="slow" advTm="14806"/>
     </mc:Fallback>
   </mc:AlternateContent>
@@ -25942,11 +26180,11 @@
   <p:clrMapOvr>
     <a:masterClrMapping/>
   </p:clrMapOvr>
-  <mc:AlternateContent xmlns:mc="http://schemas.openxmlformats.org/markup-compatibility/2006">
-    <mc:Choice xmlns:p14="http://schemas.microsoft.com/office/powerpoint/2010/main" Requires="p14">
+  <mc:AlternateContent xmlns:mc="http://schemas.openxmlformats.org/markup-compatibility/2006" xmlns:p14="http://schemas.microsoft.com/office/powerpoint/2010/main">
+    <mc:Choice Requires="p14">
       <p:transition spd="slow" p14:dur="2000" advTm="5522"/>
     </mc:Choice>
-    <mc:Fallback>
+    <mc:Fallback xmlns="">
       <p:transition spd="slow" advTm="5522"/>
     </mc:Fallback>
   </mc:AlternateContent>
@@ -27364,11 +27602,11 @@
   <p:clrMapOvr>
     <a:masterClrMapping/>
   </p:clrMapOvr>
-  <mc:AlternateContent xmlns:mc="http://schemas.openxmlformats.org/markup-compatibility/2006">
-    <mc:Choice xmlns:p14="http://schemas.microsoft.com/office/powerpoint/2010/main" Requires="p14">
+  <mc:AlternateContent xmlns:mc="http://schemas.openxmlformats.org/markup-compatibility/2006" xmlns:p14="http://schemas.microsoft.com/office/powerpoint/2010/main">
+    <mc:Choice Requires="p14">
       <p:transition spd="slow" p14:dur="2000" advTm="22049"/>
     </mc:Choice>
-    <mc:Fallback>
+    <mc:Fallback xmlns="">
       <p:transition spd="slow" advTm="22049"/>
     </mc:Fallback>
   </mc:AlternateContent>
@@ -29963,11 +30201,11 @@
   <p:clrMapOvr>
     <a:masterClrMapping/>
   </p:clrMapOvr>
-  <mc:AlternateContent xmlns:mc="http://schemas.openxmlformats.org/markup-compatibility/2006">
-    <mc:Choice xmlns:p14="http://schemas.microsoft.com/office/powerpoint/2010/main" Requires="p14">
+  <mc:AlternateContent xmlns:mc="http://schemas.openxmlformats.org/markup-compatibility/2006" xmlns:p14="http://schemas.microsoft.com/office/powerpoint/2010/main">
+    <mc:Choice Requires="p14">
       <p:transition spd="slow" p14:dur="2000" advTm="40249"/>
     </mc:Choice>
-    <mc:Fallback>
+    <mc:Fallback xmlns="">
       <p:transition spd="slow" advTm="40249"/>
     </mc:Fallback>
   </mc:AlternateContent>
@@ -31431,11 +31669,11 @@
   <p:clrMapOvr>
     <a:masterClrMapping/>
   </p:clrMapOvr>
-  <mc:AlternateContent xmlns:mc="http://schemas.openxmlformats.org/markup-compatibility/2006">
-    <mc:Choice xmlns:p14="http://schemas.microsoft.com/office/powerpoint/2010/main" Requires="p14">
+  <mc:AlternateContent xmlns:mc="http://schemas.openxmlformats.org/markup-compatibility/2006" xmlns:p14="http://schemas.microsoft.com/office/powerpoint/2010/main">
+    <mc:Choice Requires="p14">
       <p:transition spd="slow" p14:dur="2000" advTm="50476"/>
     </mc:Choice>
-    <mc:Fallback>
+    <mc:Fallback xmlns="">
       <p:transition spd="slow" advTm="50476"/>
     </mc:Fallback>
   </mc:AlternateContent>
@@ -32472,11 +32710,11 @@
   <p:clrMapOvr>
     <a:masterClrMapping/>
   </p:clrMapOvr>
-  <mc:AlternateContent xmlns:mc="http://schemas.openxmlformats.org/markup-compatibility/2006">
-    <mc:Choice xmlns:p14="http://schemas.microsoft.com/office/powerpoint/2010/main" Requires="p14">
+  <mc:AlternateContent xmlns:mc="http://schemas.openxmlformats.org/markup-compatibility/2006" xmlns:p14="http://schemas.microsoft.com/office/powerpoint/2010/main">
+    <mc:Choice Requires="p14">
       <p:transition spd="slow" p14:dur="2000" advTm="18232"/>
     </mc:Choice>
-    <mc:Fallback>
+    <mc:Fallback xmlns="">
       <p:transition spd="slow" advTm="18232"/>
     </mc:Fallback>
   </mc:AlternateContent>
@@ -37609,11 +37847,11 @@
   <p:clrMapOvr>
     <a:masterClrMapping/>
   </p:clrMapOvr>
-  <mc:AlternateContent xmlns:mc="http://schemas.openxmlformats.org/markup-compatibility/2006">
-    <mc:Choice xmlns:p14="http://schemas.microsoft.com/office/powerpoint/2010/main" Requires="p14">
+  <mc:AlternateContent xmlns:mc="http://schemas.openxmlformats.org/markup-compatibility/2006" xmlns:p14="http://schemas.microsoft.com/office/powerpoint/2010/main">
+    <mc:Choice Requires="p14">
       <p:transition spd="slow" p14:dur="2000" advTm="45699"/>
     </mc:Choice>
-    <mc:Fallback>
+    <mc:Fallback xmlns="">
       <p:transition spd="slow" advTm="45699"/>
     </mc:Fallback>
   </mc:AlternateContent>

</xml_diff>